<commit_message>
Ajout de la partie de presentation de l'application
</commit_message>
<xml_diff>
--- a/Presentation.pptx
+++ b/Presentation.pptx
@@ -318,7 +318,7 @@
           <a:p>
             <a:fld id="{4AAD347D-5ACD-4C99-B74B-A9C85AD731AF}" type="datetimeFigureOut">
               <a:rPr lang="en-US" dirty="0"/>
-              <a:t>9/26/2022</a:t>
+              <a:t>10/1/2022</a:t>
             </a:fld>
             <a:endParaRPr lang="en-US" dirty="0"/>
           </a:p>
@@ -588,7 +588,7 @@
           <a:p>
             <a:fld id="{4509A250-FF31-4206-8172-F9D3106AACB1}" type="datetimeFigureOut">
               <a:rPr lang="en-US" dirty="0"/>
-              <a:t>9/26/2022</a:t>
+              <a:t>10/1/2022</a:t>
             </a:fld>
             <a:endParaRPr lang="en-US" dirty="0"/>
           </a:p>
@@ -777,7 +777,7 @@
           <a:p>
             <a:fld id="{4509A250-FF31-4206-8172-F9D3106AACB1}" type="datetimeFigureOut">
               <a:rPr lang="en-US" dirty="0"/>
-              <a:t>9/26/2022</a:t>
+              <a:t>10/1/2022</a:t>
             </a:fld>
             <a:endParaRPr lang="en-US" dirty="0"/>
           </a:p>
@@ -1045,7 +1045,7 @@
           <a:p>
             <a:fld id="{4509A250-FF31-4206-8172-F9D3106AACB1}" type="datetimeFigureOut">
               <a:rPr lang="en-US" dirty="0"/>
-              <a:t>9/26/2022</a:t>
+              <a:t>10/1/2022</a:t>
             </a:fld>
             <a:endParaRPr lang="en-US" dirty="0"/>
           </a:p>
@@ -1381,7 +1381,7 @@
           <a:p>
             <a:fld id="{4509A250-FF31-4206-8172-F9D3106AACB1}" type="datetimeFigureOut">
               <a:rPr lang="en-US" dirty="0"/>
-              <a:t>9/26/2022</a:t>
+              <a:t>10/1/2022</a:t>
             </a:fld>
             <a:endParaRPr lang="en-US" dirty="0"/>
           </a:p>
@@ -1999,7 +1999,7 @@
           <a:p>
             <a:fld id="{4509A250-FF31-4206-8172-F9D3106AACB1}" type="datetimeFigureOut">
               <a:rPr lang="en-US" dirty="0"/>
-              <a:t>9/26/2022</a:t>
+              <a:t>10/1/2022</a:t>
             </a:fld>
             <a:endParaRPr lang="en-US" dirty="0"/>
           </a:p>
@@ -2854,7 +2854,7 @@
           <a:p>
             <a:fld id="{4509A250-FF31-4206-8172-F9D3106AACB1}" type="datetimeFigureOut">
               <a:rPr lang="en-US" dirty="0"/>
-              <a:t>9/26/2022</a:t>
+              <a:t>10/1/2022</a:t>
             </a:fld>
             <a:endParaRPr lang="en-US" dirty="0"/>
           </a:p>
@@ -3019,7 +3019,7 @@
           <a:p>
             <a:fld id="{4509A250-FF31-4206-8172-F9D3106AACB1}" type="datetimeFigureOut">
               <a:rPr lang="en-US" dirty="0"/>
-              <a:t>9/26/2022</a:t>
+              <a:t>10/1/2022</a:t>
             </a:fld>
             <a:endParaRPr lang="en-US" dirty="0"/>
           </a:p>
@@ -3194,7 +3194,7 @@
           <a:p>
             <a:fld id="{4509A250-FF31-4206-8172-F9D3106AACB1}" type="datetimeFigureOut">
               <a:rPr lang="en-US" dirty="0"/>
-              <a:t>9/26/2022</a:t>
+              <a:t>10/1/2022</a:t>
             </a:fld>
             <a:endParaRPr lang="en-US" dirty="0"/>
           </a:p>
@@ -3359,7 +3359,7 @@
           <a:p>
             <a:fld id="{4509A250-FF31-4206-8172-F9D3106AACB1}" type="datetimeFigureOut">
               <a:rPr lang="en-US" dirty="0"/>
-              <a:t>9/26/2022</a:t>
+              <a:t>10/1/2022</a:t>
             </a:fld>
             <a:endParaRPr lang="en-US" dirty="0"/>
           </a:p>
@@ -3601,7 +3601,7 @@
           <a:p>
             <a:fld id="{9796027F-7875-4030-9381-8BD8C4F21935}" type="datetimeFigureOut">
               <a:rPr lang="en-US" dirty="0"/>
-              <a:t>9/26/2022</a:t>
+              <a:t>10/1/2022</a:t>
             </a:fld>
             <a:endParaRPr lang="en-US" dirty="0"/>
           </a:p>
@@ -3888,7 +3888,7 @@
           <a:p>
             <a:fld id="{9796027F-7875-4030-9381-8BD8C4F21935}" type="datetimeFigureOut">
               <a:rPr lang="en-US" dirty="0"/>
-              <a:t>9/26/2022</a:t>
+              <a:t>10/1/2022</a:t>
             </a:fld>
             <a:endParaRPr lang="en-US" dirty="0"/>
           </a:p>
@@ -4327,7 +4327,7 @@
           <a:p>
             <a:fld id="{9796027F-7875-4030-9381-8BD8C4F21935}" type="datetimeFigureOut">
               <a:rPr lang="en-US" dirty="0"/>
-              <a:t>9/26/2022</a:t>
+              <a:t>10/1/2022</a:t>
             </a:fld>
             <a:endParaRPr lang="en-US" dirty="0"/>
           </a:p>
@@ -4440,7 +4440,7 @@
           <a:p>
             <a:fld id="{4509A250-FF31-4206-8172-F9D3106AACB1}" type="datetimeFigureOut">
               <a:rPr lang="en-US" dirty="0"/>
-              <a:t>9/26/2022</a:t>
+              <a:t>10/1/2022</a:t>
             </a:fld>
             <a:endParaRPr lang="en-US" dirty="0"/>
           </a:p>
@@ -4530,7 +4530,7 @@
           <a:p>
             <a:fld id="{4509A250-FF31-4206-8172-F9D3106AACB1}" type="datetimeFigureOut">
               <a:rPr lang="en-US" dirty="0"/>
-              <a:t>9/26/2022</a:t>
+              <a:t>10/1/2022</a:t>
             </a:fld>
             <a:endParaRPr lang="en-US" dirty="0"/>
           </a:p>
@@ -4804,7 +4804,7 @@
           <a:p>
             <a:fld id="{4509A250-FF31-4206-8172-F9D3106AACB1}" type="datetimeFigureOut">
               <a:rPr lang="en-US" dirty="0"/>
-              <a:t>9/26/2022</a:t>
+              <a:t>10/1/2022</a:t>
             </a:fld>
             <a:endParaRPr lang="en-US" dirty="0"/>
           </a:p>
@@ -5074,7 +5074,7 @@
           <a:p>
             <a:fld id="{4509A250-FF31-4206-8172-F9D3106AACB1}" type="datetimeFigureOut">
               <a:rPr lang="en-US" dirty="0"/>
-              <a:t>9/26/2022</a:t>
+              <a:t>10/1/2022</a:t>
             </a:fld>
             <a:endParaRPr lang="en-US" dirty="0"/>
           </a:p>
@@ -5498,7 +5498,7 @@
           <a:p>
             <a:fld id="{4AAD347D-5ACD-4C99-B74B-A9C85AD731AF}" type="datetimeFigureOut">
               <a:rPr lang="en-US" dirty="0"/>
-              <a:t>9/26/2022</a:t>
+              <a:t>10/1/2022</a:t>
             </a:fld>
             <a:endParaRPr lang="en-US" dirty="0"/>
           </a:p>
@@ -6245,13 +6245,6 @@
   <p:clrMapOvr>
     <a:masterClrMapping/>
   </p:clrMapOvr>
-  <p:timing>
-    <p:tnLst>
-      <p:par>
-        <p:cTn id="1" dur="indefinite" restart="never" nodeType="tmRoot"/>
-      </p:par>
-    </p:tnLst>
-  </p:timing>
 </p:sld>
 </file>
 
@@ -6377,8 +6370,8 @@
           </a:p>
         </p:txBody>
       </p:sp>
-      <mc:AlternateContent xmlns:mc="http://schemas.openxmlformats.org/markup-compatibility/2006">
-        <mc:Choice xmlns:a14="http://schemas.microsoft.com/office/drawing/2010/main" Requires="a14">
+      <mc:AlternateContent xmlns:mc="http://schemas.openxmlformats.org/markup-compatibility/2006" xmlns:a14="http://schemas.microsoft.com/office/drawing/2010/main">
+        <mc:Choice Requires="a14">
           <p:sp>
             <p:nvSpPr>
               <p:cNvPr id="5" name="ZoneTexte 4"/>
@@ -6401,6 +6394,7 @@
               </a:bodyPr>
               <a:lstStyle/>
               <a:p>
+                <a:pPr/>
                 <a14:m>
                   <m:oMathPara xmlns:m="http://purl.oclc.org/ooxml/officeDocument/math">
                     <m:oMathParaPr>
@@ -6441,7 +6435,7 @@
             </p:txBody>
           </p:sp>
         </mc:Choice>
-        <mc:Fallback>
+        <mc:Fallback xmlns:p="http://schemas.openxmlformats.org/presentationml/2006/main" xmlns:r="http://schemas.openxmlformats.org/officeDocument/2006/relationships" xmlns:a="http://schemas.openxmlformats.org/drawingml/2006/main" xmlns="">
           <p:sp>
             <p:nvSpPr>
               <p:cNvPr id="5" name="ZoneTexte 4"/>
@@ -6496,19 +6490,12 @@
         <p15:prstTrans prst="crush"/>
       </p:transition>
     </mc:Choice>
-    <mc:Fallback xmlns:p="http://schemas.openxmlformats.org/presentationml/2006/main" xmlns:r="http://schemas.openxmlformats.org/officeDocument/2006/relationships" xmlns:a="http://schemas.openxmlformats.org/drawingml/2006/main" xmlns="">
+    <mc:Fallback xmlns="" xmlns:a="http://schemas.openxmlformats.org/drawingml/2006/main" xmlns:r="http://schemas.openxmlformats.org/officeDocument/2006/relationships" xmlns:p="http://schemas.openxmlformats.org/presentationml/2006/main">
       <p:transition spd="slow">
         <p:fade/>
       </p:transition>
     </mc:Fallback>
   </mc:AlternateContent>
-  <p:timing>
-    <p:tnLst>
-      <p:par>
-        <p:cTn id="1" dur="indefinite" restart="never" nodeType="tmRoot"/>
-      </p:par>
-    </p:tnLst>
-  </p:timing>
 </p:sld>
 </file>
 
@@ -6582,7 +6569,7 @@
         </p:nvGraphicFramePr>
         <p:xfrm>
           <a:off x="1710063" y="927352"/>
-          <a:ext cx="8063348" cy="5467741"/>
+          <a:ext cx="8063348" cy="5217351"/>
         </p:xfrm>
         <a:graphic>
           <a:graphicData uri="http://purl.oclc.org/ooxml/drawingml/table">
@@ -7127,7 +7114,7 @@
                         </a:spcAft>
                       </a:pPr>
                       <a:r>
-                        <a:rPr lang="fr-FR" sz="1600" dirty="0" smtClean="0">
+                        <a:rPr lang="fr-FR" sz="1600" dirty="0">
                           <a:effectLst/>
                           <a:latin typeface="+mn-lt"/>
                           <a:ea typeface="+mn-ea"/>
@@ -7136,7 +7123,7 @@
                         <a:t>Matricule de </a:t>
                       </a:r>
                       <a:r>
-                        <a:rPr lang="fr-FR" sz="1600" dirty="0" smtClean="0">
+                        <a:rPr lang="fr-FR" sz="1600" dirty="0">
                           <a:effectLst/>
                         </a:rPr>
                         <a:t>l’enseignant</a:t>
@@ -7165,7 +7152,7 @@
                         </a:spcAft>
                       </a:pPr>
                       <a:r>
-                        <a:rPr lang="fr-FR" sz="1600" dirty="0" smtClean="0">
+                        <a:rPr lang="fr-FR" sz="1600" dirty="0">
                           <a:effectLst/>
                           <a:latin typeface="+mn-lt"/>
                           <a:ea typeface="+mn-ea"/>
@@ -7197,7 +7184,7 @@
                         </a:spcAft>
                       </a:pPr>
                       <a:r>
-                        <a:rPr lang="fr-FR" sz="1600" dirty="0" smtClean="0">
+                        <a:rPr lang="fr-FR" sz="1600" dirty="0">
                           <a:effectLst/>
                           <a:latin typeface="+mn-lt"/>
                           <a:ea typeface="+mn-ea"/>
@@ -7229,7 +7216,7 @@
                         </a:spcAft>
                       </a:pPr>
                       <a:r>
-                        <a:rPr lang="fr-FR" sz="1600" dirty="0" smtClean="0">
+                        <a:rPr lang="fr-FR" sz="1600" dirty="0">
                           <a:effectLst/>
                           <a:latin typeface="+mn-lt"/>
                           <a:ea typeface="+mn-ea"/>
@@ -7391,13 +7378,13 @@
                         </a:spcAft>
                       </a:pPr>
                       <a:r>
-                        <a:rPr lang="fr-FR" sz="1100" dirty="0" smtClean="0">
+                        <a:rPr lang="fr-FR" sz="1100" dirty="0">
                           <a:effectLst/>
                         </a:rPr>
                         <a:t> </a:t>
                       </a:r>
                       <a:r>
-                        <a:rPr lang="fr-FR" sz="1600" dirty="0" smtClean="0">
+                        <a:rPr lang="fr-FR" sz="1600" dirty="0">
                           <a:effectLst/>
                         </a:rPr>
                         <a:t>code de la matière</a:t>
@@ -7426,7 +7413,7 @@
                         </a:spcAft>
                       </a:pPr>
                       <a:r>
-                        <a:rPr lang="fr-FR" sz="1600" dirty="0" smtClean="0">
+                        <a:rPr lang="fr-FR" sz="1600" dirty="0">
                           <a:effectLst/>
                         </a:rPr>
                         <a:t>CodeMatiere</a:t>
@@ -7455,7 +7442,7 @@
                         </a:spcAft>
                       </a:pPr>
                       <a:r>
-                        <a:rPr lang="fr-FR" sz="1600" dirty="0" smtClean="0">
+                        <a:rPr lang="fr-FR" sz="1600" dirty="0">
                           <a:effectLst/>
                         </a:rPr>
                         <a:t> AN</a:t>
@@ -7484,7 +7471,7 @@
                         </a:spcAft>
                       </a:pPr>
                       <a:r>
-                        <a:rPr lang="fr-FR" sz="1600" dirty="0" smtClean="0">
+                        <a:rPr lang="fr-FR" sz="1600" dirty="0">
                           <a:effectLst/>
                         </a:rPr>
                         <a:t>10</a:t>
@@ -7520,7 +7507,7 @@
                         </a:spcAft>
                       </a:pPr>
                       <a:r>
-                        <a:rPr lang="en-US" sz="1600" dirty="0" smtClean="0">
+                        <a:rPr lang="en-US" sz="1600" dirty="0">
                           <a:effectLst/>
                           <a:latin typeface="Calibri" panose="020F0502020204030204" pitchFamily="34" charset="0"/>
                           <a:ea typeface="Calibri" panose="020F0502020204030204" pitchFamily="34" charset="0"/>
@@ -7528,12 +7515,6 @@
                         </a:rPr>
                         <a:t>Nom de la Métier</a:t>
                       </a:r>
-                      <a:endParaRPr lang="en-US" sz="1600" dirty="0">
-                        <a:effectLst/>
-                        <a:latin typeface="Calibri" panose="020F0502020204030204" pitchFamily="34" charset="0"/>
-                        <a:ea typeface="Calibri" panose="020F0502020204030204" pitchFamily="34" charset="0"/>
-                        <a:cs typeface="Times New Roman" panose="02020603050405020304" pitchFamily="18" charset="0"/>
-                      </a:endParaRPr>
                     </a:p>
                   </a:txBody>
                   <a:tcPr marL="68580" marR="68580" marT="0" marB="0"/>
@@ -7552,7 +7533,7 @@
                         </a:spcAft>
                       </a:pPr>
                       <a:r>
-                        <a:rPr lang="en-US" sz="1600" dirty="0" smtClean="0">
+                        <a:rPr lang="en-US" sz="1600" dirty="0">
                           <a:effectLst/>
                           <a:latin typeface="Calibri" panose="020F0502020204030204" pitchFamily="34" charset="0"/>
                           <a:ea typeface="Calibri" panose="020F0502020204030204" pitchFamily="34" charset="0"/>
@@ -7560,12 +7541,6 @@
                         </a:rPr>
                         <a:t>NomMatiere</a:t>
                       </a:r>
-                      <a:endParaRPr lang="en-US" sz="1600" dirty="0">
-                        <a:effectLst/>
-                        <a:latin typeface="Calibri" panose="020F0502020204030204" pitchFamily="34" charset="0"/>
-                        <a:ea typeface="Calibri" panose="020F0502020204030204" pitchFamily="34" charset="0"/>
-                        <a:cs typeface="Times New Roman" panose="02020603050405020304" pitchFamily="18" charset="0"/>
-                      </a:endParaRPr>
                     </a:p>
                   </a:txBody>
                   <a:tcPr marL="68580" marR="68580" marT="0" marB="0"/>
@@ -7584,7 +7559,7 @@
                         </a:spcAft>
                       </a:pPr>
                       <a:r>
-                        <a:rPr lang="en-US" sz="1600" dirty="0" smtClean="0">
+                        <a:rPr lang="en-US" sz="1600" dirty="0">
                           <a:effectLst/>
                           <a:latin typeface="Calibri" panose="020F0502020204030204" pitchFamily="34" charset="0"/>
                           <a:ea typeface="Calibri" panose="020F0502020204030204" pitchFamily="34" charset="0"/>
@@ -7592,12 +7567,6 @@
                         </a:rPr>
                         <a:t>A</a:t>
                       </a:r>
-                      <a:endParaRPr lang="en-US" sz="1600" dirty="0">
-                        <a:effectLst/>
-                        <a:latin typeface="Calibri" panose="020F0502020204030204" pitchFamily="34" charset="0"/>
-                        <a:ea typeface="Calibri" panose="020F0502020204030204" pitchFamily="34" charset="0"/>
-                        <a:cs typeface="Times New Roman" panose="02020603050405020304" pitchFamily="18" charset="0"/>
-                      </a:endParaRPr>
                     </a:p>
                   </a:txBody>
                   <a:tcPr marL="68580" marR="68580" marT="0" marB="0"/>
@@ -7616,7 +7585,7 @@
                         </a:spcAft>
                       </a:pPr>
                       <a:r>
-                        <a:rPr lang="en-US" sz="1600" dirty="0" smtClean="0">
+                        <a:rPr lang="en-US" sz="1600" dirty="0">
                           <a:effectLst/>
                           <a:latin typeface="Calibri" panose="020F0502020204030204" pitchFamily="34" charset="0"/>
                           <a:ea typeface="Calibri" panose="020F0502020204030204" pitchFamily="34" charset="0"/>
@@ -7624,12 +7593,6 @@
                         </a:rPr>
                         <a:t>20</a:t>
                       </a:r>
-                      <a:endParaRPr lang="en-US" sz="1600" dirty="0">
-                        <a:effectLst/>
-                        <a:latin typeface="Calibri" panose="020F0502020204030204" pitchFamily="34" charset="0"/>
-                        <a:ea typeface="Calibri" panose="020F0502020204030204" pitchFamily="34" charset="0"/>
-                        <a:cs typeface="Times New Roman" panose="02020603050405020304" pitchFamily="18" charset="0"/>
-                      </a:endParaRPr>
                     </a:p>
                   </a:txBody>
                   <a:tcPr marL="68580" marR="68580" marT="0" marB="0"/>
@@ -7778,7 +7741,7 @@
                         </a:spcAft>
                       </a:pPr>
                       <a:r>
-                        <a:rPr lang="fr-FR" sz="1600" dirty="0" smtClean="0">
+                        <a:rPr lang="fr-FR" sz="1600" dirty="0">
                           <a:effectLst/>
                         </a:rPr>
                         <a:t>Matricule de l’ étudiant</a:t>
@@ -7807,7 +7770,7 @@
                         </a:spcAft>
                       </a:pPr>
                       <a:r>
-                        <a:rPr lang="fr-FR" sz="1600" dirty="0" smtClean="0">
+                        <a:rPr lang="fr-FR" sz="1600" dirty="0">
                           <a:effectLst/>
                         </a:rPr>
                         <a:t>MatriculeE</a:t>
@@ -7901,7 +7864,7 @@
                         </a:spcAft>
                       </a:pPr>
                       <a:r>
-                        <a:rPr lang="en-US" sz="1600" b="1" dirty="0" smtClean="0">
+                        <a:rPr lang="en-US" sz="1600" b="1" dirty="0">
                           <a:effectLst/>
                           <a:latin typeface="Calibri" panose="020F0502020204030204" pitchFamily="34" charset="0"/>
                           <a:ea typeface="Calibri" panose="020F0502020204030204" pitchFamily="34" charset="0"/>
@@ -7909,12 +7872,6 @@
                         </a:rPr>
                         <a:t>Date et lieu de naissance</a:t>
                       </a:r>
-                      <a:endParaRPr lang="en-US" sz="1600" b="1" dirty="0">
-                        <a:effectLst/>
-                        <a:latin typeface="Calibri" panose="020F0502020204030204" pitchFamily="34" charset="0"/>
-                        <a:ea typeface="Calibri" panose="020F0502020204030204" pitchFamily="34" charset="0"/>
-                        <a:cs typeface="Times New Roman" panose="02020603050405020304" pitchFamily="18" charset="0"/>
-                      </a:endParaRPr>
                     </a:p>
                   </a:txBody>
                   <a:tcPr marL="68580" marR="68580" marT="0" marB="0"/>
@@ -7933,7 +7890,7 @@
                         </a:spcAft>
                       </a:pPr>
                       <a:r>
-                        <a:rPr lang="fr-FR" sz="1600" dirty="0" smtClean="0">
+                        <a:rPr lang="fr-FR" sz="1600" dirty="0">
                           <a:effectLst/>
                           <a:latin typeface="+mn-lt"/>
                           <a:ea typeface="+mn-ea"/>
@@ -8156,16 +8113,10 @@
                         <a:rPr lang="fr-FR" sz="1600" dirty="0">
                           <a:effectLst/>
                         </a:rPr>
-                        <a:t> </a:t>
+                        <a:t> Année</a:t>
                       </a:r>
                       <a:r>
-                        <a:rPr lang="fr-FR" sz="1600" dirty="0" smtClean="0">
-                          <a:effectLst/>
-                        </a:rPr>
-                        <a:t>Année</a:t>
-                      </a:r>
-                      <a:r>
-                        <a:rPr lang="fr-FR" sz="1600" baseline="0%" dirty="0" smtClean="0">
+                        <a:rPr lang="fr-FR" sz="1600" baseline="0%" dirty="0">
                           <a:effectLst/>
                         </a:rPr>
                         <a:t> Académique</a:t>
@@ -8197,13 +8148,7 @@
                         <a:rPr lang="fr-FR" sz="1600" dirty="0">
                           <a:effectLst/>
                         </a:rPr>
-                        <a:t> </a:t>
-                      </a:r>
-                      <a:r>
-                        <a:rPr lang="fr-FR" sz="1600" dirty="0" smtClean="0">
-                          <a:effectLst/>
-                        </a:rPr>
-                        <a:t>Annee</a:t>
+                        <a:t> Annee</a:t>
                       </a:r>
                       <a:endParaRPr lang="en-US" sz="1100" dirty="0">
                         <a:effectLst/>
@@ -8229,7 +8174,7 @@
                         </a:spcAft>
                       </a:pPr>
                       <a:r>
-                        <a:rPr lang="en-US" sz="1600" dirty="0" smtClean="0">
+                        <a:rPr lang="en-US" sz="1600" dirty="0">
                           <a:effectLst/>
                           <a:latin typeface="Calibri" panose="020F0502020204030204" pitchFamily="34" charset="0"/>
                           <a:ea typeface="Calibri" panose="020F0502020204030204" pitchFamily="34" charset="0"/>
@@ -8237,12 +8182,6 @@
                         </a:rPr>
                         <a:t>A</a:t>
                       </a:r>
-                      <a:endParaRPr lang="en-US" sz="1600" dirty="0">
-                        <a:effectLst/>
-                        <a:latin typeface="Calibri" panose="020F0502020204030204" pitchFamily="34" charset="0"/>
-                        <a:ea typeface="Calibri" panose="020F0502020204030204" pitchFamily="34" charset="0"/>
-                        <a:cs typeface="Times New Roman" panose="02020603050405020304" pitchFamily="18" charset="0"/>
-                      </a:endParaRPr>
                     </a:p>
                   </a:txBody>
                   <a:tcPr marL="68580" marR="68580" marT="0" marB="0"/>
@@ -8264,13 +8203,7 @@
                         <a:rPr lang="fr-FR" sz="1600" dirty="0">
                           <a:effectLst/>
                         </a:rPr>
-                        <a:t> </a:t>
-                      </a:r>
-                      <a:r>
-                        <a:rPr lang="fr-FR" sz="1600" dirty="0" smtClean="0">
-                          <a:effectLst/>
-                        </a:rPr>
-                        <a:t>20</a:t>
+                        <a:t> 20</a:t>
                       </a:r>
                       <a:endParaRPr lang="en-US" sz="1100" dirty="0">
                         <a:effectLst/>
@@ -8303,7 +8236,7 @@
                         </a:spcAft>
                       </a:pPr>
                       <a:r>
-                        <a:rPr lang="en-US" sz="1600" dirty="0" smtClean="0">
+                        <a:rPr lang="en-US" sz="1600" dirty="0">
                           <a:effectLst/>
                           <a:latin typeface="Calibri" panose="020F0502020204030204" pitchFamily="34" charset="0"/>
                           <a:ea typeface="Calibri" panose="020F0502020204030204" pitchFamily="34" charset="0"/>
@@ -8312,7 +8245,7 @@
                         <a:t>Note de l’ </a:t>
                       </a:r>
                       <a:r>
-                        <a:rPr lang="fr-FR" sz="1600" noProof="0" dirty="0" smtClean="0">
+                        <a:rPr lang="fr-FR" sz="1600" noProof="0" dirty="0">
                           <a:effectLst/>
                           <a:latin typeface="Calibri" panose="020F0502020204030204" pitchFamily="34" charset="0"/>
                           <a:ea typeface="Calibri" panose="020F0502020204030204" pitchFamily="34" charset="0"/>
@@ -8320,12 +8253,6 @@
                         </a:rPr>
                         <a:t>Etudiant </a:t>
                       </a:r>
-                      <a:endParaRPr lang="fr-FR" sz="1600" noProof="0" dirty="0">
-                        <a:effectLst/>
-                        <a:latin typeface="Calibri" panose="020F0502020204030204" pitchFamily="34" charset="0"/>
-                        <a:ea typeface="Calibri" panose="020F0502020204030204" pitchFamily="34" charset="0"/>
-                        <a:cs typeface="Times New Roman" panose="02020603050405020304" pitchFamily="18" charset="0"/>
-                      </a:endParaRPr>
                     </a:p>
                   </a:txBody>
                   <a:tcPr marL="68580" marR="68580" marT="0" marB="0"/>
@@ -8344,7 +8271,7 @@
                         </a:spcAft>
                       </a:pPr>
                       <a:r>
-                        <a:rPr lang="en-US" sz="1600" dirty="0" smtClean="0">
+                        <a:rPr lang="en-US" sz="1600" dirty="0">
                           <a:effectLst/>
                           <a:latin typeface="Calibri" panose="020F0502020204030204" pitchFamily="34" charset="0"/>
                           <a:ea typeface="Calibri" panose="020F0502020204030204" pitchFamily="34" charset="0"/>
@@ -8352,12 +8279,6 @@
                         </a:rPr>
                         <a:t>Note</a:t>
                       </a:r>
-                      <a:endParaRPr lang="en-US" sz="1600" dirty="0">
-                        <a:effectLst/>
-                        <a:latin typeface="Calibri" panose="020F0502020204030204" pitchFamily="34" charset="0"/>
-                        <a:ea typeface="Calibri" panose="020F0502020204030204" pitchFamily="34" charset="0"/>
-                        <a:cs typeface="Times New Roman" panose="02020603050405020304" pitchFamily="18" charset="0"/>
-                      </a:endParaRPr>
                     </a:p>
                   </a:txBody>
                   <a:tcPr marL="68580" marR="68580" marT="0" marB="0"/>
@@ -8376,7 +8297,7 @@
                         </a:spcAft>
                       </a:pPr>
                       <a:r>
-                        <a:rPr lang="en-US" sz="1600" dirty="0" smtClean="0">
+                        <a:rPr lang="en-US" sz="1600" dirty="0">
                           <a:effectLst/>
                           <a:latin typeface="Calibri" panose="020F0502020204030204" pitchFamily="34" charset="0"/>
                           <a:ea typeface="Calibri" panose="020F0502020204030204" pitchFamily="34" charset="0"/>
@@ -8384,12 +8305,6 @@
                         </a:rPr>
                         <a:t>N</a:t>
                       </a:r>
-                      <a:endParaRPr lang="en-US" sz="1600" dirty="0">
-                        <a:effectLst/>
-                        <a:latin typeface="Calibri" panose="020F0502020204030204" pitchFamily="34" charset="0"/>
-                        <a:ea typeface="Calibri" panose="020F0502020204030204" pitchFamily="34" charset="0"/>
-                        <a:cs typeface="Times New Roman" panose="02020603050405020304" pitchFamily="18" charset="0"/>
-                      </a:endParaRPr>
                     </a:p>
                   </a:txBody>
                   <a:tcPr marL="68580" marR="68580" marT="0" marB="0"/>
@@ -8408,7 +8323,7 @@
                         </a:spcAft>
                       </a:pPr>
                       <a:r>
-                        <a:rPr lang="en-US" sz="1600" dirty="0" smtClean="0">
+                        <a:rPr lang="en-US" sz="1600" dirty="0">
                           <a:effectLst/>
                           <a:latin typeface="Calibri" panose="020F0502020204030204" pitchFamily="34" charset="0"/>
                           <a:ea typeface="Calibri" panose="020F0502020204030204" pitchFamily="34" charset="0"/>
@@ -8416,12 +8331,6 @@
                         </a:rPr>
                         <a:t>3</a:t>
                       </a:r>
-                      <a:endParaRPr lang="en-US" sz="1600" dirty="0">
-                        <a:effectLst/>
-                        <a:latin typeface="Calibri" panose="020F0502020204030204" pitchFamily="34" charset="0"/>
-                        <a:ea typeface="Calibri" panose="020F0502020204030204" pitchFamily="34" charset="0"/>
-                        <a:cs typeface="Times New Roman" panose="02020603050405020304" pitchFamily="18" charset="0"/>
-                      </a:endParaRPr>
                     </a:p>
                   </a:txBody>
                   <a:tcPr marL="68580" marR="68580" marT="0" marB="0"/>
@@ -8447,7 +8356,7 @@
                         </a:spcAft>
                       </a:pPr>
                       <a:r>
-                        <a:rPr lang="fr-FR" sz="1600" noProof="0" dirty="0" smtClean="0">
+                        <a:rPr lang="fr-FR" sz="1600" noProof="0" dirty="0">
                           <a:effectLst/>
                           <a:latin typeface="Calibri" panose="020F0502020204030204" pitchFamily="34" charset="0"/>
                           <a:ea typeface="Calibri" panose="020F0502020204030204" pitchFamily="34" charset="0"/>
@@ -8455,12 +8364,6 @@
                         </a:rPr>
                         <a:t>L’ identifiant de l’ agent</a:t>
                       </a:r>
-                      <a:endParaRPr lang="fr-FR" sz="1600" noProof="0" dirty="0">
-                        <a:effectLst/>
-                        <a:latin typeface="Calibri" panose="020F0502020204030204" pitchFamily="34" charset="0"/>
-                        <a:ea typeface="Calibri" panose="020F0502020204030204" pitchFamily="34" charset="0"/>
-                        <a:cs typeface="Times New Roman" panose="02020603050405020304" pitchFamily="18" charset="0"/>
-                      </a:endParaRPr>
                     </a:p>
                   </a:txBody>
                   <a:tcPr marL="68580" marR="68580" marT="0" marB="0"/>
@@ -8479,7 +8382,7 @@
                         </a:spcAft>
                       </a:pPr>
                       <a:r>
-                        <a:rPr lang="en-US" sz="1600" dirty="0" smtClean="0">
+                        <a:rPr lang="en-US" sz="1600" dirty="0">
                           <a:effectLst/>
                           <a:latin typeface="Calibri" panose="020F0502020204030204" pitchFamily="34" charset="0"/>
                           <a:ea typeface="Calibri" panose="020F0502020204030204" pitchFamily="34" charset="0"/>
@@ -8487,12 +8390,6 @@
                         </a:rPr>
                         <a:t>IdAgent</a:t>
                       </a:r>
-                      <a:endParaRPr lang="en-US" sz="1600" dirty="0">
-                        <a:effectLst/>
-                        <a:latin typeface="Calibri" panose="020F0502020204030204" pitchFamily="34" charset="0"/>
-                        <a:ea typeface="Calibri" panose="020F0502020204030204" pitchFamily="34" charset="0"/>
-                        <a:cs typeface="Times New Roman" panose="02020603050405020304" pitchFamily="18" charset="0"/>
-                      </a:endParaRPr>
                     </a:p>
                   </a:txBody>
                   <a:tcPr marL="68580" marR="68580" marT="0" marB="0"/>
@@ -8511,7 +8408,7 @@
                         </a:spcAft>
                       </a:pPr>
                       <a:r>
-                        <a:rPr lang="en-US" sz="1600" dirty="0" smtClean="0">
+                        <a:rPr lang="en-US" sz="1600" dirty="0">
                           <a:effectLst/>
                           <a:latin typeface="Calibri" panose="020F0502020204030204" pitchFamily="34" charset="0"/>
                           <a:ea typeface="Calibri" panose="020F0502020204030204" pitchFamily="34" charset="0"/>
@@ -8519,12 +8416,6 @@
                         </a:rPr>
                         <a:t>N</a:t>
                       </a:r>
-                      <a:endParaRPr lang="en-US" sz="1600" dirty="0">
-                        <a:effectLst/>
-                        <a:latin typeface="Calibri" panose="020F0502020204030204" pitchFamily="34" charset="0"/>
-                        <a:ea typeface="Calibri" panose="020F0502020204030204" pitchFamily="34" charset="0"/>
-                        <a:cs typeface="Times New Roman" panose="02020603050405020304" pitchFamily="18" charset="0"/>
-                      </a:endParaRPr>
                     </a:p>
                   </a:txBody>
                   <a:tcPr marL="68580" marR="68580" marT="0" marB="0"/>
@@ -8543,7 +8434,7 @@
                         </a:spcAft>
                       </a:pPr>
                       <a:r>
-                        <a:rPr lang="en-US" sz="1600" dirty="0" smtClean="0">
+                        <a:rPr lang="en-US" sz="1600" dirty="0">
                           <a:effectLst/>
                           <a:latin typeface="Calibri" panose="020F0502020204030204" pitchFamily="34" charset="0"/>
                           <a:ea typeface="Calibri" panose="020F0502020204030204" pitchFamily="34" charset="0"/>
@@ -8551,12 +8442,6 @@
                         </a:rPr>
                         <a:t>6</a:t>
                       </a:r>
-                      <a:endParaRPr lang="en-US" sz="1600" dirty="0">
-                        <a:effectLst/>
-                        <a:latin typeface="Calibri" panose="020F0502020204030204" pitchFamily="34" charset="0"/>
-                        <a:ea typeface="Calibri" panose="020F0502020204030204" pitchFamily="34" charset="0"/>
-                        <a:cs typeface="Times New Roman" panose="02020603050405020304" pitchFamily="18" charset="0"/>
-                      </a:endParaRPr>
                     </a:p>
                   </a:txBody>
                   <a:tcPr marL="68580" marR="68580" marT="0" marB="0"/>
@@ -8582,7 +8467,7 @@
                         </a:spcAft>
                       </a:pPr>
                       <a:r>
-                        <a:rPr lang="fr-FR" sz="1600" noProof="0" dirty="0" smtClean="0">
+                        <a:rPr lang="fr-FR" sz="1600" noProof="0" dirty="0">
                           <a:effectLst/>
                           <a:latin typeface="Calibri" panose="020F0502020204030204" pitchFamily="34" charset="0"/>
                           <a:ea typeface="Calibri" panose="020F0502020204030204" pitchFamily="34" charset="0"/>
@@ -8590,12 +8475,6 @@
                         </a:rPr>
                         <a:t>Nom de l’ Agent</a:t>
                       </a:r>
-                      <a:endParaRPr lang="fr-FR" sz="1600" noProof="0" dirty="0">
-                        <a:effectLst/>
-                        <a:latin typeface="Calibri" panose="020F0502020204030204" pitchFamily="34" charset="0"/>
-                        <a:ea typeface="Calibri" panose="020F0502020204030204" pitchFamily="34" charset="0"/>
-                        <a:cs typeface="Times New Roman" panose="02020603050405020304" pitchFamily="18" charset="0"/>
-                      </a:endParaRPr>
                     </a:p>
                   </a:txBody>
                   <a:tcPr marL="68580" marR="68580" marT="0" marB="0"/>
@@ -8614,7 +8493,7 @@
                         </a:spcAft>
                       </a:pPr>
                       <a:r>
-                        <a:rPr lang="en-US" sz="1600" dirty="0" smtClean="0">
+                        <a:rPr lang="en-US" sz="1600" dirty="0">
                           <a:effectLst/>
                           <a:latin typeface="Calibri" panose="020F0502020204030204" pitchFamily="34" charset="0"/>
                           <a:ea typeface="Calibri" panose="020F0502020204030204" pitchFamily="34" charset="0"/>
@@ -8622,12 +8501,6 @@
                         </a:rPr>
                         <a:t>NomAg</a:t>
                       </a:r>
-                      <a:endParaRPr lang="en-US" sz="1600" dirty="0">
-                        <a:effectLst/>
-                        <a:latin typeface="Calibri" panose="020F0502020204030204" pitchFamily="34" charset="0"/>
-                        <a:ea typeface="Calibri" panose="020F0502020204030204" pitchFamily="34" charset="0"/>
-                        <a:cs typeface="Times New Roman" panose="02020603050405020304" pitchFamily="18" charset="0"/>
-                      </a:endParaRPr>
                     </a:p>
                   </a:txBody>
                   <a:tcPr marL="68580" marR="68580" marT="0" marB="0"/>
@@ -8646,7 +8519,7 @@
                         </a:spcAft>
                       </a:pPr>
                       <a:r>
-                        <a:rPr lang="en-US" sz="1600" dirty="0" smtClean="0">
+                        <a:rPr lang="en-US" sz="1600" dirty="0">
                           <a:effectLst/>
                           <a:latin typeface="Calibri" panose="020F0502020204030204" pitchFamily="34" charset="0"/>
                           <a:ea typeface="Calibri" panose="020F0502020204030204" pitchFamily="34" charset="0"/>
@@ -8654,12 +8527,6 @@
                         </a:rPr>
                         <a:t>A</a:t>
                       </a:r>
-                      <a:endParaRPr lang="en-US" sz="1600" dirty="0">
-                        <a:effectLst/>
-                        <a:latin typeface="Calibri" panose="020F0502020204030204" pitchFamily="34" charset="0"/>
-                        <a:ea typeface="Calibri" panose="020F0502020204030204" pitchFamily="34" charset="0"/>
-                        <a:cs typeface="Times New Roman" panose="02020603050405020304" pitchFamily="18" charset="0"/>
-                      </a:endParaRPr>
                     </a:p>
                   </a:txBody>
                   <a:tcPr marL="68580" marR="68580" marT="0" marB="0"/>
@@ -8678,7 +8545,7 @@
                         </a:spcAft>
                       </a:pPr>
                       <a:r>
-                        <a:rPr lang="en-US" sz="1600" dirty="0" smtClean="0">
+                        <a:rPr lang="en-US" sz="1600" dirty="0">
                           <a:effectLst/>
                           <a:latin typeface="Calibri" panose="020F0502020204030204" pitchFamily="34" charset="0"/>
                           <a:ea typeface="Calibri" panose="020F0502020204030204" pitchFamily="34" charset="0"/>
@@ -8686,12 +8553,6 @@
                         </a:rPr>
                         <a:t>20</a:t>
                       </a:r>
-                      <a:endParaRPr lang="en-US" sz="1600" dirty="0">
-                        <a:effectLst/>
-                        <a:latin typeface="Calibri" panose="020F0502020204030204" pitchFamily="34" charset="0"/>
-                        <a:ea typeface="Calibri" panose="020F0502020204030204" pitchFamily="34" charset="0"/>
-                        <a:cs typeface="Times New Roman" panose="02020603050405020304" pitchFamily="18" charset="0"/>
-                      </a:endParaRPr>
                     </a:p>
                   </a:txBody>
                   <a:tcPr marL="68580" marR="68580" marT="0" marB="0"/>
@@ -8717,7 +8578,7 @@
                         </a:spcAft>
                       </a:pPr>
                       <a:r>
-                        <a:rPr lang="fr-FR" sz="1600" noProof="0" dirty="0" smtClean="0">
+                        <a:rPr lang="fr-FR" sz="1600" noProof="0" dirty="0">
                           <a:effectLst/>
                           <a:latin typeface="Calibri" panose="020F0502020204030204" pitchFamily="34" charset="0"/>
                           <a:ea typeface="Calibri" panose="020F0502020204030204" pitchFamily="34" charset="0"/>
@@ -8726,7 +8587,7 @@
                         <a:t>Prénom</a:t>
                       </a:r>
                       <a:r>
-                        <a:rPr lang="fr-FR" sz="1600" baseline="0%" noProof="0" dirty="0" smtClean="0">
+                        <a:rPr lang="fr-FR" sz="1600" baseline="0%" noProof="0" dirty="0">
                           <a:effectLst/>
                           <a:latin typeface="Calibri" panose="020F0502020204030204" pitchFamily="34" charset="0"/>
                           <a:ea typeface="Calibri" panose="020F0502020204030204" pitchFamily="34" charset="0"/>
@@ -8758,7 +8619,7 @@
                         </a:spcAft>
                       </a:pPr>
                       <a:r>
-                        <a:rPr lang="en-US" sz="1600" dirty="0" smtClean="0">
+                        <a:rPr lang="en-US" sz="1600" dirty="0">
                           <a:effectLst/>
                           <a:latin typeface="Calibri" panose="020F0502020204030204" pitchFamily="34" charset="0"/>
                           <a:ea typeface="Calibri" panose="020F0502020204030204" pitchFamily="34" charset="0"/>
@@ -8766,12 +8627,6 @@
                         </a:rPr>
                         <a:t>PrenomAg</a:t>
                       </a:r>
-                      <a:endParaRPr lang="en-US" sz="1600" dirty="0">
-                        <a:effectLst/>
-                        <a:latin typeface="Calibri" panose="020F0502020204030204" pitchFamily="34" charset="0"/>
-                        <a:ea typeface="Calibri" panose="020F0502020204030204" pitchFamily="34" charset="0"/>
-                        <a:cs typeface="Times New Roman" panose="02020603050405020304" pitchFamily="18" charset="0"/>
-                      </a:endParaRPr>
                     </a:p>
                   </a:txBody>
                   <a:tcPr marL="68580" marR="68580" marT="0" marB="0"/>
@@ -8790,7 +8645,7 @@
                         </a:spcAft>
                       </a:pPr>
                       <a:r>
-                        <a:rPr lang="en-US" sz="1600" dirty="0" smtClean="0">
+                        <a:rPr lang="en-US" sz="1600" dirty="0">
                           <a:effectLst/>
                           <a:latin typeface="Calibri" panose="020F0502020204030204" pitchFamily="34" charset="0"/>
                           <a:ea typeface="Calibri" panose="020F0502020204030204" pitchFamily="34" charset="0"/>
@@ -8798,12 +8653,6 @@
                         </a:rPr>
                         <a:t>A</a:t>
                       </a:r>
-                      <a:endParaRPr lang="en-US" sz="1600" dirty="0">
-                        <a:effectLst/>
-                        <a:latin typeface="Calibri" panose="020F0502020204030204" pitchFamily="34" charset="0"/>
-                        <a:ea typeface="Calibri" panose="020F0502020204030204" pitchFamily="34" charset="0"/>
-                        <a:cs typeface="Times New Roman" panose="02020603050405020304" pitchFamily="18" charset="0"/>
-                      </a:endParaRPr>
                     </a:p>
                   </a:txBody>
                   <a:tcPr marL="68580" marR="68580" marT="0" marB="0"/>
@@ -8822,7 +8671,7 @@
                         </a:spcAft>
                       </a:pPr>
                       <a:r>
-                        <a:rPr lang="en-US" sz="1600" dirty="0" smtClean="0">
+                        <a:rPr lang="en-US" sz="1600" dirty="0">
                           <a:effectLst/>
                           <a:latin typeface="Calibri" panose="020F0502020204030204" pitchFamily="34" charset="0"/>
                           <a:ea typeface="Calibri" panose="020F0502020204030204" pitchFamily="34" charset="0"/>
@@ -8830,12 +8679,6 @@
                         </a:rPr>
                         <a:t>20</a:t>
                       </a:r>
-                      <a:endParaRPr lang="en-US" sz="1600" dirty="0">
-                        <a:effectLst/>
-                        <a:latin typeface="Calibri" panose="020F0502020204030204" pitchFamily="34" charset="0"/>
-                        <a:ea typeface="Calibri" panose="020F0502020204030204" pitchFamily="34" charset="0"/>
-                        <a:cs typeface="Times New Roman" panose="02020603050405020304" pitchFamily="18" charset="0"/>
-                      </a:endParaRPr>
                     </a:p>
                   </a:txBody>
                   <a:tcPr marL="68580" marR="68580" marT="0" marB="0"/>
@@ -8861,7 +8704,7 @@
                         </a:spcAft>
                       </a:pPr>
                       <a:r>
-                        <a:rPr lang="fr-FR" sz="1600" noProof="0" dirty="0" smtClean="0">
+                        <a:rPr lang="fr-FR" sz="1600" noProof="0" dirty="0">
                           <a:effectLst/>
                           <a:latin typeface="Calibri" panose="020F0502020204030204" pitchFamily="34" charset="0"/>
                           <a:ea typeface="Calibri" panose="020F0502020204030204" pitchFamily="34" charset="0"/>
@@ -8869,12 +8712,6 @@
                         </a:rPr>
                         <a:t>Date de connexion</a:t>
                       </a:r>
-                      <a:endParaRPr lang="fr-FR" sz="1600" noProof="0" dirty="0">
-                        <a:effectLst/>
-                        <a:latin typeface="Calibri" panose="020F0502020204030204" pitchFamily="34" charset="0"/>
-                        <a:ea typeface="Calibri" panose="020F0502020204030204" pitchFamily="34" charset="0"/>
-                        <a:cs typeface="Times New Roman" panose="02020603050405020304" pitchFamily="18" charset="0"/>
-                      </a:endParaRPr>
                     </a:p>
                   </a:txBody>
                   <a:tcPr marL="68580" marR="68580" marT="0" marB="0"/>
@@ -8893,7 +8730,7 @@
                         </a:spcAft>
                       </a:pPr>
                       <a:r>
-                        <a:rPr lang="en-US" sz="1600" dirty="0" smtClean="0">
+                        <a:rPr lang="en-US" sz="1600" dirty="0">
                           <a:effectLst/>
                           <a:latin typeface="Calibri" panose="020F0502020204030204" pitchFamily="34" charset="0"/>
                           <a:ea typeface="Calibri" panose="020F0502020204030204" pitchFamily="34" charset="0"/>
@@ -8901,12 +8738,6 @@
                         </a:rPr>
                         <a:t>DateC</a:t>
                       </a:r>
-                      <a:endParaRPr lang="en-US" sz="1600" dirty="0">
-                        <a:effectLst/>
-                        <a:latin typeface="Calibri" panose="020F0502020204030204" pitchFamily="34" charset="0"/>
-                        <a:ea typeface="Calibri" panose="020F0502020204030204" pitchFamily="34" charset="0"/>
-                        <a:cs typeface="Times New Roman" panose="02020603050405020304" pitchFamily="18" charset="0"/>
-                      </a:endParaRPr>
                     </a:p>
                   </a:txBody>
                   <a:tcPr marL="68580" marR="68580" marT="0" marB="0"/>
@@ -8925,7 +8756,7 @@
                         </a:spcAft>
                       </a:pPr>
                       <a:r>
-                        <a:rPr lang="en-US" sz="1600" dirty="0" smtClean="0">
+                        <a:rPr lang="en-US" sz="1600" dirty="0">
                           <a:effectLst/>
                           <a:latin typeface="Calibri" panose="020F0502020204030204" pitchFamily="34" charset="0"/>
                           <a:ea typeface="Calibri" panose="020F0502020204030204" pitchFamily="34" charset="0"/>
@@ -8933,12 +8764,6 @@
                         </a:rPr>
                         <a:t>A</a:t>
                       </a:r>
-                      <a:endParaRPr lang="en-US" sz="1600" dirty="0">
-                        <a:effectLst/>
-                        <a:latin typeface="Calibri" panose="020F0502020204030204" pitchFamily="34" charset="0"/>
-                        <a:ea typeface="Calibri" panose="020F0502020204030204" pitchFamily="34" charset="0"/>
-                        <a:cs typeface="Times New Roman" panose="02020603050405020304" pitchFamily="18" charset="0"/>
-                      </a:endParaRPr>
                     </a:p>
                   </a:txBody>
                   <a:tcPr marL="68580" marR="68580" marT="0" marB="0"/>
@@ -8957,7 +8782,7 @@
                         </a:spcAft>
                       </a:pPr>
                       <a:r>
-                        <a:rPr lang="en-US" sz="1600" dirty="0" smtClean="0">
+                        <a:rPr lang="en-US" sz="1600" dirty="0">
                           <a:effectLst/>
                           <a:latin typeface="Calibri" panose="020F0502020204030204" pitchFamily="34" charset="0"/>
                           <a:ea typeface="Calibri" panose="020F0502020204030204" pitchFamily="34" charset="0"/>
@@ -8965,12 +8790,6 @@
                         </a:rPr>
                         <a:t>20</a:t>
                       </a:r>
-                      <a:endParaRPr lang="en-US" sz="1600" dirty="0">
-                        <a:effectLst/>
-                        <a:latin typeface="Calibri" panose="020F0502020204030204" pitchFamily="34" charset="0"/>
-                        <a:ea typeface="Calibri" panose="020F0502020204030204" pitchFamily="34" charset="0"/>
-                        <a:cs typeface="Times New Roman" panose="02020603050405020304" pitchFamily="18" charset="0"/>
-                      </a:endParaRPr>
                     </a:p>
                   </a:txBody>
                   <a:tcPr marL="68580" marR="68580" marT="0" marB="0"/>
@@ -8996,7 +8815,7 @@
                         </a:spcAft>
                       </a:pPr>
                       <a:r>
-                        <a:rPr lang="fr-FR" sz="1600" noProof="0" dirty="0" smtClean="0">
+                        <a:rPr lang="fr-FR" sz="1600" noProof="0" dirty="0">
                           <a:effectLst/>
                           <a:latin typeface="Calibri" panose="020F0502020204030204" pitchFamily="34" charset="0"/>
                           <a:ea typeface="Calibri" panose="020F0502020204030204" pitchFamily="34" charset="0"/>
@@ -9004,12 +8823,6 @@
                         </a:rPr>
                         <a:t>Mot de passe</a:t>
                       </a:r>
-                      <a:endParaRPr lang="fr-FR" sz="1600" noProof="0" dirty="0">
-                        <a:effectLst/>
-                        <a:latin typeface="Calibri" panose="020F0502020204030204" pitchFamily="34" charset="0"/>
-                        <a:ea typeface="Calibri" panose="020F0502020204030204" pitchFamily="34" charset="0"/>
-                        <a:cs typeface="Times New Roman" panose="02020603050405020304" pitchFamily="18" charset="0"/>
-                      </a:endParaRPr>
                     </a:p>
                   </a:txBody>
                   <a:tcPr marL="68580" marR="68580" marT="0" marB="0"/>
@@ -9028,7 +8841,7 @@
                         </a:spcAft>
                       </a:pPr>
                       <a:r>
-                        <a:rPr lang="en-US" sz="1600" dirty="0" smtClean="0">
+                        <a:rPr lang="en-US" sz="1600" dirty="0">
                           <a:effectLst/>
                           <a:latin typeface="Calibri" panose="020F0502020204030204" pitchFamily="34" charset="0"/>
                           <a:ea typeface="Calibri" panose="020F0502020204030204" pitchFamily="34" charset="0"/>
@@ -9036,12 +8849,6 @@
                         </a:rPr>
                         <a:t>MotDePasse</a:t>
                       </a:r>
-                      <a:endParaRPr lang="en-US" sz="1600" dirty="0">
-                        <a:effectLst/>
-                        <a:latin typeface="Calibri" panose="020F0502020204030204" pitchFamily="34" charset="0"/>
-                        <a:ea typeface="Calibri" panose="020F0502020204030204" pitchFamily="34" charset="0"/>
-                        <a:cs typeface="Times New Roman" panose="02020603050405020304" pitchFamily="18" charset="0"/>
-                      </a:endParaRPr>
                     </a:p>
                   </a:txBody>
                   <a:tcPr marL="68580" marR="68580" marT="0" marB="0"/>
@@ -9060,7 +8867,7 @@
                         </a:spcAft>
                       </a:pPr>
                       <a:r>
-                        <a:rPr lang="en-US" sz="1600" dirty="0" smtClean="0">
+                        <a:rPr lang="en-US" sz="1600" dirty="0">
                           <a:effectLst/>
                           <a:latin typeface="Calibri" panose="020F0502020204030204" pitchFamily="34" charset="0"/>
                           <a:ea typeface="Calibri" panose="020F0502020204030204" pitchFamily="34" charset="0"/>
@@ -9068,12 +8875,6 @@
                         </a:rPr>
                         <a:t>A</a:t>
                       </a:r>
-                      <a:endParaRPr lang="en-US" sz="1600" dirty="0">
-                        <a:effectLst/>
-                        <a:latin typeface="Calibri" panose="020F0502020204030204" pitchFamily="34" charset="0"/>
-                        <a:ea typeface="Calibri" panose="020F0502020204030204" pitchFamily="34" charset="0"/>
-                        <a:cs typeface="Times New Roman" panose="02020603050405020304" pitchFamily="18" charset="0"/>
-                      </a:endParaRPr>
                     </a:p>
                   </a:txBody>
                   <a:tcPr marL="68580" marR="68580" marT="0" marB="0"/>
@@ -9092,7 +8893,7 @@
                         </a:spcAft>
                       </a:pPr>
                       <a:r>
-                        <a:rPr lang="en-US" sz="1600" dirty="0" smtClean="0">
+                        <a:rPr lang="en-US" sz="1600" dirty="0">
                           <a:effectLst/>
                           <a:latin typeface="Calibri" panose="020F0502020204030204" pitchFamily="34" charset="0"/>
                           <a:ea typeface="Calibri" panose="020F0502020204030204" pitchFamily="34" charset="0"/>
@@ -9100,12 +8901,6 @@
                         </a:rPr>
                         <a:t>8</a:t>
                       </a:r>
-                      <a:endParaRPr lang="en-US" sz="1600" dirty="0">
-                        <a:effectLst/>
-                        <a:latin typeface="Calibri" panose="020F0502020204030204" pitchFamily="34" charset="0"/>
-                        <a:ea typeface="Calibri" panose="020F0502020204030204" pitchFamily="34" charset="0"/>
-                        <a:cs typeface="Times New Roman" panose="02020603050405020304" pitchFamily="18" charset="0"/>
-                      </a:endParaRPr>
                     </a:p>
                   </a:txBody>
                   <a:tcPr marL="68580" marR="68580" marT="0" marB="0"/>
@@ -9131,7 +8926,7 @@
                         </a:spcAft>
                       </a:pPr>
                       <a:r>
-                        <a:rPr lang="fr-FR" sz="1600" noProof="0" dirty="0" smtClean="0">
+                        <a:rPr lang="fr-FR" sz="1600" noProof="0" dirty="0">
                           <a:effectLst/>
                           <a:latin typeface="Calibri" panose="020F0502020204030204" pitchFamily="34" charset="0"/>
                           <a:ea typeface="Calibri" panose="020F0502020204030204" pitchFamily="34" charset="0"/>
@@ -9140,7 +8935,7 @@
                         <a:t>Titre de l’ évènement</a:t>
                       </a:r>
                       <a:r>
-                        <a:rPr lang="fr-FR" sz="1600" baseline="0%" noProof="0" dirty="0" smtClean="0">
+                        <a:rPr lang="fr-FR" sz="1600" baseline="0%" noProof="0" dirty="0">
                           <a:effectLst/>
                           <a:latin typeface="Calibri" panose="020F0502020204030204" pitchFamily="34" charset="0"/>
                           <a:ea typeface="Calibri" panose="020F0502020204030204" pitchFamily="34" charset="0"/>
@@ -9172,7 +8967,7 @@
                         </a:spcAft>
                       </a:pPr>
                       <a:r>
-                        <a:rPr lang="en-US" sz="1600" dirty="0" smtClean="0">
+                        <a:rPr lang="en-US" sz="1600" dirty="0">
                           <a:effectLst/>
                           <a:latin typeface="Calibri" panose="020F0502020204030204" pitchFamily="34" charset="0"/>
                           <a:ea typeface="Calibri" panose="020F0502020204030204" pitchFamily="34" charset="0"/>
@@ -9180,12 +8975,6 @@
                         </a:rPr>
                         <a:t>Titre</a:t>
                       </a:r>
-                      <a:endParaRPr lang="en-US" sz="1600" dirty="0">
-                        <a:effectLst/>
-                        <a:latin typeface="Calibri" panose="020F0502020204030204" pitchFamily="34" charset="0"/>
-                        <a:ea typeface="Calibri" panose="020F0502020204030204" pitchFamily="34" charset="0"/>
-                        <a:cs typeface="Times New Roman" panose="02020603050405020304" pitchFamily="18" charset="0"/>
-                      </a:endParaRPr>
                     </a:p>
                   </a:txBody>
                   <a:tcPr marL="68580" marR="68580" marT="0" marB="0"/>
@@ -9204,7 +8993,7 @@
                         </a:spcAft>
                       </a:pPr>
                       <a:r>
-                        <a:rPr lang="en-US" sz="1600" dirty="0" smtClean="0">
+                        <a:rPr lang="en-US" sz="1600" dirty="0">
                           <a:effectLst/>
                           <a:latin typeface="Calibri" panose="020F0502020204030204" pitchFamily="34" charset="0"/>
                           <a:ea typeface="Calibri" panose="020F0502020204030204" pitchFamily="34" charset="0"/>
@@ -9212,12 +9001,6 @@
                         </a:rPr>
                         <a:t>A</a:t>
                       </a:r>
-                      <a:endParaRPr lang="en-US" sz="1600" dirty="0">
-                        <a:effectLst/>
-                        <a:latin typeface="Calibri" panose="020F0502020204030204" pitchFamily="34" charset="0"/>
-                        <a:ea typeface="Calibri" panose="020F0502020204030204" pitchFamily="34" charset="0"/>
-                        <a:cs typeface="Times New Roman" panose="02020603050405020304" pitchFamily="18" charset="0"/>
-                      </a:endParaRPr>
                     </a:p>
                   </a:txBody>
                   <a:tcPr marL="68580" marR="68580" marT="0" marB="0"/>
@@ -9236,7 +9019,7 @@
                         </a:spcAft>
                       </a:pPr>
                       <a:r>
-                        <a:rPr lang="en-US" sz="1600" dirty="0" smtClean="0">
+                        <a:rPr lang="en-US" sz="1600" dirty="0">
                           <a:effectLst/>
                           <a:latin typeface="Calibri" panose="020F0502020204030204" pitchFamily="34" charset="0"/>
                           <a:ea typeface="Calibri" panose="020F0502020204030204" pitchFamily="34" charset="0"/>
@@ -9244,12 +9027,6 @@
                         </a:rPr>
                         <a:t>20</a:t>
                       </a:r>
-                      <a:endParaRPr lang="en-US" sz="1600" dirty="0">
-                        <a:effectLst/>
-                        <a:latin typeface="Calibri" panose="020F0502020204030204" pitchFamily="34" charset="0"/>
-                        <a:ea typeface="Calibri" panose="020F0502020204030204" pitchFamily="34" charset="0"/>
-                        <a:cs typeface="Times New Roman" panose="02020603050405020304" pitchFamily="18" charset="0"/>
-                      </a:endParaRPr>
                     </a:p>
                   </a:txBody>
                   <a:tcPr marL="68580" marR="68580" marT="0" marB="0"/>
@@ -9275,7 +9052,7 @@
                         </a:spcAft>
                       </a:pPr>
                       <a:r>
-                        <a:rPr lang="fr-FR" sz="1600" noProof="0" dirty="0" smtClean="0">
+                        <a:rPr lang="fr-FR" sz="1600" noProof="0" dirty="0">
                           <a:effectLst/>
                           <a:latin typeface="Calibri" panose="020F0502020204030204" pitchFamily="34" charset="0"/>
                           <a:ea typeface="Calibri" panose="020F0502020204030204" pitchFamily="34" charset="0"/>
@@ -9283,12 +9060,6 @@
                         </a:rPr>
                         <a:t>Date de l’ évènement</a:t>
                       </a:r>
-                      <a:endParaRPr lang="fr-FR" sz="1600" noProof="0" dirty="0">
-                        <a:effectLst/>
-                        <a:latin typeface="Calibri" panose="020F0502020204030204" pitchFamily="34" charset="0"/>
-                        <a:ea typeface="Calibri" panose="020F0502020204030204" pitchFamily="34" charset="0"/>
-                        <a:cs typeface="Times New Roman" panose="02020603050405020304" pitchFamily="18" charset="0"/>
-                      </a:endParaRPr>
                     </a:p>
                   </a:txBody>
                   <a:tcPr marL="68580" marR="68580" marT="0" marB="0"/>
@@ -9307,7 +9078,7 @@
                         </a:spcAft>
                       </a:pPr>
                       <a:r>
-                        <a:rPr lang="en-US" sz="1600" dirty="0" smtClean="0">
+                        <a:rPr lang="en-US" sz="1600" dirty="0">
                           <a:effectLst/>
                           <a:latin typeface="Calibri" panose="020F0502020204030204" pitchFamily="34" charset="0"/>
                           <a:ea typeface="Calibri" panose="020F0502020204030204" pitchFamily="34" charset="0"/>
@@ -9315,12 +9086,6 @@
                         </a:rPr>
                         <a:t>DateE</a:t>
                       </a:r>
-                      <a:endParaRPr lang="en-US" sz="1600" dirty="0">
-                        <a:effectLst/>
-                        <a:latin typeface="Calibri" panose="020F0502020204030204" pitchFamily="34" charset="0"/>
-                        <a:ea typeface="Calibri" panose="020F0502020204030204" pitchFamily="34" charset="0"/>
-                        <a:cs typeface="Times New Roman" panose="02020603050405020304" pitchFamily="18" charset="0"/>
-                      </a:endParaRPr>
                     </a:p>
                   </a:txBody>
                   <a:tcPr marL="68580" marR="68580" marT="0" marB="0"/>
@@ -9339,7 +9104,7 @@
                         </a:spcAft>
                       </a:pPr>
                       <a:r>
-                        <a:rPr lang="en-US" sz="1600" dirty="0" smtClean="0">
+                        <a:rPr lang="en-US" sz="1600" dirty="0">
                           <a:effectLst/>
                           <a:latin typeface="Calibri" panose="020F0502020204030204" pitchFamily="34" charset="0"/>
                           <a:ea typeface="Calibri" panose="020F0502020204030204" pitchFamily="34" charset="0"/>
@@ -9347,12 +9112,6 @@
                         </a:rPr>
                         <a:t>A</a:t>
                       </a:r>
-                      <a:endParaRPr lang="en-US" sz="1600" dirty="0">
-                        <a:effectLst/>
-                        <a:latin typeface="Calibri" panose="020F0502020204030204" pitchFamily="34" charset="0"/>
-                        <a:ea typeface="Calibri" panose="020F0502020204030204" pitchFamily="34" charset="0"/>
-                        <a:cs typeface="Times New Roman" panose="02020603050405020304" pitchFamily="18" charset="0"/>
-                      </a:endParaRPr>
                     </a:p>
                   </a:txBody>
                   <a:tcPr marL="68580" marR="68580" marT="0" marB="0"/>
@@ -9371,7 +9130,7 @@
                         </a:spcAft>
                       </a:pPr>
                       <a:r>
-                        <a:rPr lang="en-US" sz="1600" dirty="0" smtClean="0">
+                        <a:rPr lang="en-US" sz="1600" dirty="0">
                           <a:effectLst/>
                           <a:latin typeface="Calibri" panose="020F0502020204030204" pitchFamily="34" charset="0"/>
                           <a:ea typeface="Calibri" panose="020F0502020204030204" pitchFamily="34" charset="0"/>
@@ -9379,12 +9138,6 @@
                         </a:rPr>
                         <a:t>10</a:t>
                       </a:r>
-                      <a:endParaRPr lang="en-US" sz="1600" dirty="0">
-                        <a:effectLst/>
-                        <a:latin typeface="Calibri" panose="020F0502020204030204" pitchFamily="34" charset="0"/>
-                        <a:ea typeface="Calibri" panose="020F0502020204030204" pitchFamily="34" charset="0"/>
-                        <a:cs typeface="Times New Roman" panose="02020603050405020304" pitchFamily="18" charset="0"/>
-                      </a:endParaRPr>
                     </a:p>
                   </a:txBody>
                   <a:tcPr marL="68580" marR="68580" marT="0" marB="0"/>
@@ -9399,8 +9152,8 @@
           </a:graphicData>
         </a:graphic>
       </p:graphicFrame>
-      <mc:AlternateContent xmlns:mc="http://schemas.openxmlformats.org/markup-compatibility/2006">
-        <mc:Choice xmlns:a14="http://schemas.microsoft.com/office/drawing/2010/main" Requires="a14">
+      <mc:AlternateContent xmlns:mc="http://schemas.openxmlformats.org/markup-compatibility/2006" xmlns:a14="http://schemas.microsoft.com/office/drawing/2010/main">
+        <mc:Choice Requires="a14">
           <p:sp>
             <p:nvSpPr>
               <p:cNvPr id="5" name="ZoneTexte 4"/>
@@ -9423,6 +9176,7 @@
               </a:bodyPr>
               <a:lstStyle/>
               <a:p>
+                <a:pPr/>
                 <a14:m>
                   <m:oMathPara xmlns:m="http://purl.oclc.org/ooxml/officeDocument/math">
                     <m:oMathParaPr>
@@ -9463,7 +9217,7 @@
             </p:txBody>
           </p:sp>
         </mc:Choice>
-        <mc:Fallback>
+        <mc:Fallback xmlns:p="http://schemas.openxmlformats.org/presentationml/2006/main" xmlns:r="http://schemas.openxmlformats.org/officeDocument/2006/relationships" xmlns:a="http://schemas.openxmlformats.org/drawingml/2006/main" xmlns="">
           <p:sp>
             <p:nvSpPr>
               <p:cNvPr id="5" name="ZoneTexte 4"/>
@@ -9518,19 +9272,12 @@
         <p14:conveyor dir="l"/>
       </p:transition>
     </mc:Choice>
-    <mc:Fallback xmlns:p="http://schemas.openxmlformats.org/presentationml/2006/main" xmlns:r="http://schemas.openxmlformats.org/officeDocument/2006/relationships" xmlns:a="http://schemas.openxmlformats.org/drawingml/2006/main" xmlns="">
+    <mc:Fallback xmlns="" xmlns:a="http://schemas.openxmlformats.org/drawingml/2006/main" xmlns:r="http://schemas.openxmlformats.org/officeDocument/2006/relationships" xmlns:p="http://schemas.openxmlformats.org/presentationml/2006/main">
       <p:transition spd="slow">
         <p:fade/>
       </p:transition>
     </mc:Fallback>
   </mc:AlternateContent>
-  <p:timing>
-    <p:tnLst>
-      <p:par>
-        <p:cTn id="1" dur="indefinite" restart="never" nodeType="tmRoot"/>
-      </p:par>
-    </p:tnLst>
-  </p:timing>
 </p:sld>
 </file>
 
@@ -9579,13 +9326,6 @@
               </a:rPr>
               <a:t>Modelé relationnel des données (MRD)</a:t>
             </a:r>
-            <a:r>
-              <a:rPr lang="fr-FR" sz="4400" dirty="0">
-                <a:latin typeface="Arial" panose="020B0604020202020204" pitchFamily="34" charset="0"/>
-                <a:cs typeface="Arial" panose="020B0604020202020204" pitchFamily="34" charset="0"/>
-              </a:rPr>
-              <a:t/>
-            </a:r>
             <a:br>
               <a:rPr lang="fr-FR" sz="4400" dirty="0">
                 <a:latin typeface="Arial" panose="020B0604020202020204" pitchFamily="34" charset="0"/>
@@ -9618,7 +9358,7 @@
         </p:nvGraphicFramePr>
         <p:xfrm>
           <a:off x="3046984" y="3377535"/>
-          <a:ext cx="1656282" cy="1871095"/>
+          <a:ext cx="1656282" cy="1855855"/>
         </p:xfrm>
         <a:graphic>
           <a:graphicData uri="http://purl.oclc.org/ooxml/drawingml/table">
@@ -10065,7 +9805,7 @@
         </p:nvGraphicFramePr>
         <p:xfrm>
           <a:off x="9608313" y="3224525"/>
-          <a:ext cx="1832179" cy="2315401"/>
+          <a:ext cx="1832179" cy="2286572"/>
         </p:xfrm>
         <a:graphic>
           <a:graphicData uri="http://purl.oclc.org/ooxml/drawingml/table">
@@ -10457,7 +10197,7 @@
         </p:nvGraphicFramePr>
         <p:xfrm>
           <a:off x="470033" y="4068618"/>
-          <a:ext cx="1448435" cy="2608898"/>
+          <a:ext cx="1448435" cy="2580069"/>
         </p:xfrm>
         <a:graphic>
           <a:graphicData uri="http://purl.oclc.org/ooxml/drawingml/table">
@@ -10722,7 +10462,7 @@
         </p:nvGraphicFramePr>
         <p:xfrm>
           <a:off x="2303717" y="2106700"/>
-          <a:ext cx="1486535" cy="967867"/>
+          <a:ext cx="1486535" cy="952627"/>
         </p:xfrm>
         <a:graphic>
           <a:graphicData uri="http://purl.oclc.org/ooxml/drawingml/table">
@@ -10874,7 +10614,7 @@
         </p:nvGraphicFramePr>
         <p:xfrm>
           <a:off x="7523173" y="2051532"/>
-          <a:ext cx="1757154" cy="910082"/>
+          <a:ext cx="1757154" cy="894842"/>
         </p:xfrm>
         <a:graphic>
           <a:graphicData uri="http://purl.oclc.org/ooxml/drawingml/table">
@@ -11001,7 +10741,7 @@
         </p:nvGraphicFramePr>
         <p:xfrm>
           <a:off x="6499895" y="5612490"/>
-          <a:ext cx="1486535" cy="935292"/>
+          <a:ext cx="1486535" cy="921703"/>
         </p:xfrm>
         <a:graphic>
           <a:graphicData uri="http://purl.oclc.org/ooxml/drawingml/table">
@@ -11443,8 +11183,8 @@
           </a:fontRef>
         </p:style>
       </p:cxnSp>
-      <mc:AlternateContent xmlns:mc="http://schemas.openxmlformats.org/markup-compatibility/2006">
-        <mc:Choice xmlns:a14="http://schemas.microsoft.com/office/drawing/2010/main" Requires="a14">
+      <mc:AlternateContent xmlns:mc="http://schemas.openxmlformats.org/markup-compatibility/2006" xmlns:a14="http://schemas.microsoft.com/office/drawing/2010/main">
+        <mc:Choice Requires="a14">
           <p:sp>
             <p:nvSpPr>
               <p:cNvPr id="20" name="ZoneTexte 19"/>
@@ -11467,6 +11207,7 @@
               </a:bodyPr>
               <a:lstStyle/>
               <a:p>
+                <a:pPr/>
                 <a14:m>
                   <m:oMathPara xmlns:m="http://purl.oclc.org/ooxml/officeDocument/math">
                     <m:oMathParaPr>
@@ -11507,7 +11248,7 @@
             </p:txBody>
           </p:sp>
         </mc:Choice>
-        <mc:Fallback>
+        <mc:Fallback xmlns:p="http://schemas.openxmlformats.org/presentationml/2006/main" xmlns:r="http://schemas.openxmlformats.org/officeDocument/2006/relationships" xmlns:a="http://schemas.openxmlformats.org/drawingml/2006/main" xmlns="">
           <p:sp>
             <p:nvSpPr>
               <p:cNvPr id="20" name="ZoneTexte 19"/>
@@ -11562,7 +11303,7 @@
         <p14:window dir="vert"/>
       </p:transition>
     </mc:Choice>
-    <mc:Fallback xmlns:p="http://schemas.openxmlformats.org/presentationml/2006/main" xmlns:r="http://schemas.openxmlformats.org/officeDocument/2006/relationships" xmlns:a="http://schemas.openxmlformats.org/drawingml/2006/main" xmlns="">
+    <mc:Fallback xmlns="" xmlns:a="http://schemas.openxmlformats.org/drawingml/2006/main" xmlns:r="http://schemas.openxmlformats.org/officeDocument/2006/relationships" xmlns:p="http://schemas.openxmlformats.org/presentationml/2006/main">
       <p:transition spd="slow">
         <p:fade/>
       </p:transition>
@@ -13383,8 +13124,8 @@
           </a:p>
         </p:txBody>
       </p:sp>
-      <mc:AlternateContent xmlns:mc="http://schemas.openxmlformats.org/markup-compatibility/2006">
-        <mc:Choice xmlns:a14="http://schemas.microsoft.com/office/drawing/2010/main" Requires="a14">
+      <mc:AlternateContent xmlns:mc="http://schemas.openxmlformats.org/markup-compatibility/2006" xmlns:a14="http://schemas.microsoft.com/office/drawing/2010/main">
+        <mc:Choice Requires="a14">
           <p:sp>
             <p:nvSpPr>
               <p:cNvPr id="4" name="ZoneTexte 3"/>
@@ -13407,6 +13148,7 @@
               </a:bodyPr>
               <a:lstStyle/>
               <a:p>
+                <a:pPr/>
                 <a14:m>
                   <m:oMathPara xmlns:m="http://purl.oclc.org/ooxml/officeDocument/math">
                     <m:oMathParaPr>
@@ -13447,7 +13189,7 @@
             </p:txBody>
           </p:sp>
         </mc:Choice>
-        <mc:Fallback>
+        <mc:Fallback xmlns:p="http://schemas.openxmlformats.org/presentationml/2006/main" xmlns:r="http://schemas.openxmlformats.org/officeDocument/2006/relationships" xmlns:a="http://schemas.openxmlformats.org/drawingml/2006/main" xmlns="">
           <p:sp>
             <p:nvSpPr>
               <p:cNvPr id="4" name="ZoneTexte 3"/>
@@ -13502,19 +13244,12 @@
         <p15:prstTrans prst="fracture"/>
       </p:transition>
     </mc:Choice>
-    <mc:Fallback xmlns="" xmlns:a="http://schemas.openxmlformats.org/drawingml/2006/main" xmlns:r="http://schemas.openxmlformats.org/officeDocument/2006/relationships" xmlns:p="http://schemas.openxmlformats.org/presentationml/2006/main">
+    <mc:Fallback xmlns:p="http://schemas.openxmlformats.org/presentationml/2006/main" xmlns:r="http://schemas.openxmlformats.org/officeDocument/2006/relationships" xmlns:a="http://schemas.openxmlformats.org/drawingml/2006/main" xmlns="">
       <p:transition spd="slow">
         <p:fade/>
       </p:transition>
     </mc:Fallback>
   </mc:AlternateContent>
-  <p:timing>
-    <p:tnLst>
-      <p:par>
-        <p:cTn id="1" dur="indefinite" restart="never" nodeType="tmRoot"/>
-      </p:par>
-    </p:tnLst>
-  </p:timing>
 </p:sld>
 </file>
 
@@ -13653,8 +13388,8 @@
           </a:prstGeom>
         </p:spPr>
       </p:pic>
-      <mc:AlternateContent xmlns:mc="http://schemas.openxmlformats.org/markup-compatibility/2006">
-        <mc:Choice xmlns:a14="http://schemas.microsoft.com/office/drawing/2010/main" Requires="a14">
+      <mc:AlternateContent xmlns:mc="http://schemas.openxmlformats.org/markup-compatibility/2006" xmlns:a14="http://schemas.microsoft.com/office/drawing/2010/main">
+        <mc:Choice Requires="a14">
           <p:sp>
             <p:nvSpPr>
               <p:cNvPr id="6" name="ZoneTexte 5"/>
@@ -13677,6 +13412,7 @@
               </a:bodyPr>
               <a:lstStyle/>
               <a:p>
+                <a:pPr/>
                 <a14:m>
                   <m:oMathPara xmlns:m="http://purl.oclc.org/ooxml/officeDocument/math">
                     <m:oMathParaPr>
@@ -13717,7 +13453,7 @@
             </p:txBody>
           </p:sp>
         </mc:Choice>
-        <mc:Fallback>
+        <mc:Fallback xmlns:p="http://schemas.openxmlformats.org/presentationml/2006/main" xmlns:r="http://schemas.openxmlformats.org/officeDocument/2006/relationships" xmlns:a="http://schemas.openxmlformats.org/drawingml/2006/main" xmlns="">
           <p:sp>
             <p:nvSpPr>
               <p:cNvPr id="6" name="ZoneTexte 5"/>
@@ -13772,7 +13508,7 @@
         <p14:ferris dir="l"/>
       </p:transition>
     </mc:Choice>
-    <mc:Fallback xmlns:p="http://schemas.openxmlformats.org/presentationml/2006/main" xmlns:r="http://schemas.openxmlformats.org/officeDocument/2006/relationships" xmlns:a="http://schemas.openxmlformats.org/drawingml/2006/main" xmlns="">
+    <mc:Fallback xmlns="" xmlns:a="http://schemas.openxmlformats.org/drawingml/2006/main" xmlns:r="http://schemas.openxmlformats.org/officeDocument/2006/relationships" xmlns:p="http://schemas.openxmlformats.org/presentationml/2006/main">
       <p:transition spd="slow">
         <p:fade/>
       </p:transition>
@@ -14156,8 +13892,8 @@
           </a:prstGeom>
         </p:spPr>
       </p:pic>
-      <mc:AlternateContent xmlns:mc="http://schemas.openxmlformats.org/markup-compatibility/2006">
-        <mc:Choice xmlns:a14="http://schemas.microsoft.com/office/drawing/2010/main" Requires="a14">
+      <mc:AlternateContent xmlns:mc="http://schemas.openxmlformats.org/markup-compatibility/2006" xmlns:a14="http://schemas.microsoft.com/office/drawing/2010/main">
+        <mc:Choice Requires="a14">
           <p:sp>
             <p:nvSpPr>
               <p:cNvPr id="7" name="ZoneTexte 6"/>
@@ -14180,6 +13916,7 @@
               </a:bodyPr>
               <a:lstStyle/>
               <a:p>
+                <a:pPr/>
                 <a14:m>
                   <m:oMathPara xmlns:m="http://purl.oclc.org/ooxml/officeDocument/math">
                     <m:oMathParaPr>
@@ -14220,7 +13957,7 @@
             </p:txBody>
           </p:sp>
         </mc:Choice>
-        <mc:Fallback>
+        <mc:Fallback xmlns:p="http://schemas.openxmlformats.org/presentationml/2006/main" xmlns:r="http://schemas.openxmlformats.org/officeDocument/2006/relationships" xmlns:a="http://schemas.openxmlformats.org/drawingml/2006/main" xmlns="">
           <p:sp>
             <p:nvSpPr>
               <p:cNvPr id="7" name="ZoneTexte 6"/>
@@ -14275,7 +14012,7 @@
         <p14:conveyor dir="l"/>
       </p:transition>
     </mc:Choice>
-    <mc:Fallback xmlns:p="http://schemas.openxmlformats.org/presentationml/2006/main" xmlns:r="http://schemas.openxmlformats.org/officeDocument/2006/relationships" xmlns:a="http://schemas.openxmlformats.org/drawingml/2006/main" xmlns="">
+    <mc:Fallback xmlns="" xmlns:a="http://schemas.openxmlformats.org/drawingml/2006/main" xmlns:r="http://schemas.openxmlformats.org/officeDocument/2006/relationships" xmlns:p="http://schemas.openxmlformats.org/presentationml/2006/main">
       <p:transition spd="slow">
         <p:fade/>
       </p:transition>
@@ -14510,8 +14247,8 @@
           </a:prstGeom>
         </p:spPr>
       </p:pic>
-      <mc:AlternateContent xmlns:mc="http://schemas.openxmlformats.org/markup-compatibility/2006">
-        <mc:Choice xmlns:a14="http://schemas.microsoft.com/office/drawing/2010/main" Requires="a14">
+      <mc:AlternateContent xmlns:mc="http://schemas.openxmlformats.org/markup-compatibility/2006" xmlns:a14="http://schemas.microsoft.com/office/drawing/2010/main">
+        <mc:Choice Requires="a14">
           <p:sp>
             <p:nvSpPr>
               <p:cNvPr id="6" name="ZoneTexte 5"/>
@@ -14534,6 +14271,7 @@
               </a:bodyPr>
               <a:lstStyle/>
               <a:p>
+                <a:pPr/>
                 <a14:m>
                   <m:oMathPara xmlns:m="http://purl.oclc.org/ooxml/officeDocument/math">
                     <m:oMathParaPr>
@@ -14574,7 +14312,7 @@
             </p:txBody>
           </p:sp>
         </mc:Choice>
-        <mc:Fallback>
+        <mc:Fallback xmlns:p="http://schemas.openxmlformats.org/presentationml/2006/main" xmlns:r="http://schemas.openxmlformats.org/officeDocument/2006/relationships" xmlns:a="http://schemas.openxmlformats.org/drawingml/2006/main" xmlns="">
           <p:sp>
             <p:nvSpPr>
               <p:cNvPr id="6" name="ZoneTexte 5"/>
@@ -14629,7 +14367,7 @@
         <p14:conveyor dir="l"/>
       </p:transition>
     </mc:Choice>
-    <mc:Fallback xmlns:p="http://schemas.openxmlformats.org/presentationml/2006/main" xmlns:r="http://schemas.openxmlformats.org/officeDocument/2006/relationships" xmlns:a="http://schemas.openxmlformats.org/drawingml/2006/main" xmlns="">
+    <mc:Fallback xmlns="" xmlns:a="http://schemas.openxmlformats.org/drawingml/2006/main" xmlns:r="http://schemas.openxmlformats.org/officeDocument/2006/relationships" xmlns:p="http://schemas.openxmlformats.org/presentationml/2006/main">
       <p:transition spd="slow">
         <p:fade/>
       </p:transition>
@@ -15313,8 +15051,8 @@
           </a:prstGeom>
         </p:spPr>
       </p:pic>
-      <mc:AlternateContent xmlns:mc="http://schemas.openxmlformats.org/markup-compatibility/2006">
-        <mc:Choice xmlns:a14="http://schemas.microsoft.com/office/drawing/2010/main" Requires="a14">
+      <mc:AlternateContent xmlns:mc="http://schemas.openxmlformats.org/markup-compatibility/2006" xmlns:a14="http://schemas.microsoft.com/office/drawing/2010/main">
+        <mc:Choice Requires="a14">
           <p:sp>
             <p:nvSpPr>
               <p:cNvPr id="5" name="ZoneTexte 4"/>
@@ -15337,6 +15075,7 @@
               </a:bodyPr>
               <a:lstStyle/>
               <a:p>
+                <a:pPr/>
                 <a14:m>
                   <m:oMathPara xmlns:m="http://purl.oclc.org/ooxml/officeDocument/math">
                     <m:oMathParaPr>
@@ -15377,7 +15116,7 @@
             </p:txBody>
           </p:sp>
         </mc:Choice>
-        <mc:Fallback>
+        <mc:Fallback xmlns:p="http://schemas.openxmlformats.org/presentationml/2006/main" xmlns:r="http://schemas.openxmlformats.org/officeDocument/2006/relationships" xmlns:a="http://schemas.openxmlformats.org/drawingml/2006/main" xmlns="">
           <p:sp>
             <p:nvSpPr>
               <p:cNvPr id="5" name="ZoneTexte 4"/>
@@ -15432,7 +15171,7 @@
         <p14:conveyor dir="l"/>
       </p:transition>
     </mc:Choice>
-    <mc:Fallback xmlns:p="http://schemas.openxmlformats.org/presentationml/2006/main" xmlns:r="http://schemas.openxmlformats.org/officeDocument/2006/relationships" xmlns:a="http://schemas.openxmlformats.org/drawingml/2006/main" xmlns="">
+    <mc:Fallback xmlns="" xmlns:a="http://schemas.openxmlformats.org/drawingml/2006/main" xmlns:r="http://schemas.openxmlformats.org/officeDocument/2006/relationships" xmlns:p="http://schemas.openxmlformats.org/presentationml/2006/main">
       <p:transition spd="slow">
         <p:fade/>
       </p:transition>
@@ -16116,8 +15855,8 @@
           </a:prstGeom>
         </p:spPr>
       </p:pic>
-      <mc:AlternateContent xmlns:mc="http://schemas.openxmlformats.org/markup-compatibility/2006">
-        <mc:Choice xmlns:a14="http://schemas.microsoft.com/office/drawing/2010/main" Requires="a14">
+      <mc:AlternateContent xmlns:mc="http://schemas.openxmlformats.org/markup-compatibility/2006" xmlns:a14="http://schemas.microsoft.com/office/drawing/2010/main">
+        <mc:Choice Requires="a14">
           <p:sp>
             <p:nvSpPr>
               <p:cNvPr id="6" name="ZoneTexte 5"/>
@@ -16140,6 +15879,7 @@
               </a:bodyPr>
               <a:lstStyle/>
               <a:p>
+                <a:pPr/>
                 <a14:m>
                   <m:oMathPara xmlns:m="http://purl.oclc.org/ooxml/officeDocument/math">
                     <m:oMathParaPr>
@@ -16180,7 +15920,7 @@
             </p:txBody>
           </p:sp>
         </mc:Choice>
-        <mc:Fallback>
+        <mc:Fallback xmlns:p="http://schemas.openxmlformats.org/presentationml/2006/main" xmlns:r="http://schemas.openxmlformats.org/officeDocument/2006/relationships" xmlns:a="http://schemas.openxmlformats.org/drawingml/2006/main" xmlns="">
           <p:sp>
             <p:nvSpPr>
               <p:cNvPr id="6" name="ZoneTexte 5"/>
@@ -16235,7 +15975,7 @@
         <p14:conveyor dir="l"/>
       </p:transition>
     </mc:Choice>
-    <mc:Fallback xmlns:p="http://schemas.openxmlformats.org/presentationml/2006/main" xmlns:r="http://schemas.openxmlformats.org/officeDocument/2006/relationships" xmlns:a="http://schemas.openxmlformats.org/drawingml/2006/main" xmlns="">
+    <mc:Fallback xmlns="" xmlns:a="http://schemas.openxmlformats.org/drawingml/2006/main" xmlns:r="http://schemas.openxmlformats.org/officeDocument/2006/relationships" xmlns:p="http://schemas.openxmlformats.org/presentationml/2006/main">
       <p:transition spd="slow">
         <p:fade/>
       </p:transition>
@@ -16859,13 +16599,6 @@
               </a:rPr>
               <a:t>Présentation d’ une version beta de l’ application</a:t>
             </a:r>
-            <a:r>
-              <a:rPr lang="fr-FR" sz="4400" dirty="0">
-                <a:latin typeface="Arial" panose="020B0604020202020204" pitchFamily="34" charset="0"/>
-                <a:cs typeface="Arial" panose="020B0604020202020204" pitchFamily="34" charset="0"/>
-              </a:rPr>
-              <a:t/>
-            </a:r>
             <a:br>
               <a:rPr lang="fr-FR" sz="4400" dirty="0">
                 <a:latin typeface="Arial" panose="020B0604020202020204" pitchFamily="34" charset="0"/>
@@ -16908,8 +16641,8 @@
           </a:prstGeom>
         </p:spPr>
       </p:pic>
-      <mc:AlternateContent xmlns:mc="http://schemas.openxmlformats.org/markup-compatibility/2006">
-        <mc:Choice xmlns:a14="http://schemas.microsoft.com/office/drawing/2010/main" Requires="a14">
+      <mc:AlternateContent xmlns:mc="http://schemas.openxmlformats.org/markup-compatibility/2006" xmlns:a14="http://schemas.microsoft.com/office/drawing/2010/main">
+        <mc:Choice Requires="a14">
           <p:sp>
             <p:nvSpPr>
               <p:cNvPr id="7" name="ZoneTexte 6"/>
@@ -16932,6 +16665,7 @@
               </a:bodyPr>
               <a:lstStyle/>
               <a:p>
+                <a:pPr/>
                 <a14:m>
                   <m:oMathPara xmlns:m="http://purl.oclc.org/ooxml/officeDocument/math">
                     <m:oMathParaPr>
@@ -16972,7 +16706,7 @@
             </p:txBody>
           </p:sp>
         </mc:Choice>
-        <mc:Fallback>
+        <mc:Fallback xmlns:p="http://schemas.openxmlformats.org/presentationml/2006/main" xmlns:r="http://schemas.openxmlformats.org/officeDocument/2006/relationships" xmlns:a="http://schemas.openxmlformats.org/drawingml/2006/main" xmlns="">
           <p:sp>
             <p:nvSpPr>
               <p:cNvPr id="7" name="ZoneTexte 6"/>
@@ -17027,19 +16761,12 @@
         <p15:prstTrans prst="peelOff"/>
       </p:transition>
     </mc:Choice>
-    <mc:Fallback xmlns:p="http://schemas.openxmlformats.org/presentationml/2006/main" xmlns:r="http://schemas.openxmlformats.org/officeDocument/2006/relationships" xmlns:a="http://schemas.openxmlformats.org/drawingml/2006/main" xmlns="">
+    <mc:Fallback xmlns="" xmlns:a="http://schemas.openxmlformats.org/drawingml/2006/main" xmlns:r="http://schemas.openxmlformats.org/officeDocument/2006/relationships" xmlns:p="http://schemas.openxmlformats.org/presentationml/2006/main">
       <p:transition spd="slow">
         <p:fade/>
       </p:transition>
     </mc:Fallback>
   </mc:AlternateContent>
-  <p:timing>
-    <p:tnLst>
-      <p:par>
-        <p:cTn id="1" dur="indefinite" restart="never" nodeType="tmRoot"/>
-      </p:par>
-    </p:tnLst>
-  </p:timing>
 </p:sld>
 </file>
 
@@ -17121,8 +16848,8 @@
           </a:p>
         </p:txBody>
       </p:sp>
-      <mc:AlternateContent xmlns:mc="http://schemas.openxmlformats.org/markup-compatibility/2006">
-        <mc:Choice xmlns:a14="http://schemas.microsoft.com/office/drawing/2010/main" Requires="a14">
+      <mc:AlternateContent xmlns:mc="http://schemas.openxmlformats.org/markup-compatibility/2006" xmlns:a14="http://schemas.microsoft.com/office/drawing/2010/main">
+        <mc:Choice Requires="a14">
           <p:sp>
             <p:nvSpPr>
               <p:cNvPr id="4" name="ZoneTexte 3"/>
@@ -17145,6 +16872,7 @@
               </a:bodyPr>
               <a:lstStyle/>
               <a:p>
+                <a:pPr/>
                 <a14:m>
                   <m:oMathPara xmlns:m="http://purl.oclc.org/ooxml/officeDocument/math">
                     <m:oMathParaPr>
@@ -17185,7 +16913,7 @@
             </p:txBody>
           </p:sp>
         </mc:Choice>
-        <mc:Fallback>
+        <mc:Fallback xmlns:p="http://schemas.openxmlformats.org/presentationml/2006/main" xmlns:r="http://schemas.openxmlformats.org/officeDocument/2006/relationships" xmlns:a="http://schemas.openxmlformats.org/drawingml/2006/main" xmlns="">
           <p:sp>
             <p:nvSpPr>
               <p:cNvPr id="4" name="ZoneTexte 3"/>
@@ -17240,7 +16968,7 @@
         <p15:prstTrans prst="curtains"/>
       </p:transition>
     </mc:Choice>
-    <mc:Fallback xmlns="" xmlns:a="http://schemas.openxmlformats.org/drawingml/2006/main" xmlns:r="http://schemas.openxmlformats.org/officeDocument/2006/relationships" xmlns:p="http://schemas.openxmlformats.org/presentationml/2006/main">
+    <mc:Fallback xmlns:p="http://schemas.openxmlformats.org/presentationml/2006/main" xmlns:r="http://schemas.openxmlformats.org/officeDocument/2006/relationships" xmlns:a="http://schemas.openxmlformats.org/drawingml/2006/main" xmlns="">
       <p:transition spd="slow">
         <p:fade/>
       </p:transition>
@@ -17446,8 +17174,8 @@
           </a:p>
         </p:txBody>
       </p:sp>
-      <mc:AlternateContent xmlns:mc="http://schemas.openxmlformats.org/markup-compatibility/2006">
-        <mc:Choice xmlns:a14="http://schemas.microsoft.com/office/drawing/2010/main" Requires="a14">
+      <mc:AlternateContent xmlns:mc="http://schemas.openxmlformats.org/markup-compatibility/2006" xmlns:a14="http://schemas.microsoft.com/office/drawing/2010/main">
+        <mc:Choice Requires="a14">
           <p:sp>
             <p:nvSpPr>
               <p:cNvPr id="4" name="ZoneTexte 3"/>
@@ -17470,6 +17198,7 @@
               </a:bodyPr>
               <a:lstStyle/>
               <a:p>
+                <a:pPr/>
                 <a14:m>
                   <m:oMathPara xmlns:m="http://purl.oclc.org/ooxml/officeDocument/math">
                     <m:oMathParaPr>
@@ -17510,7 +17239,7 @@
             </p:txBody>
           </p:sp>
         </mc:Choice>
-        <mc:Fallback>
+        <mc:Fallback xmlns:p="http://schemas.openxmlformats.org/presentationml/2006/main" xmlns:r="http://schemas.openxmlformats.org/officeDocument/2006/relationships" xmlns:a="http://schemas.openxmlformats.org/drawingml/2006/main" xmlns="">
           <p:sp>
             <p:nvSpPr>
               <p:cNvPr id="4" name="ZoneTexte 3"/>
@@ -17565,19 +17294,12 @@
         <p15:prstTrans prst="fallOver"/>
       </p:transition>
     </mc:Choice>
-    <mc:Fallback xmlns:p="http://schemas.openxmlformats.org/presentationml/2006/main" xmlns:r="http://schemas.openxmlformats.org/officeDocument/2006/relationships" xmlns:a="http://schemas.openxmlformats.org/drawingml/2006/main" xmlns="">
+    <mc:Fallback xmlns="" xmlns:a="http://schemas.openxmlformats.org/drawingml/2006/main" xmlns:r="http://schemas.openxmlformats.org/officeDocument/2006/relationships" xmlns:p="http://schemas.openxmlformats.org/presentationml/2006/main">
       <p:transition spd="slow">
         <p:fade/>
       </p:transition>
     </mc:Fallback>
   </mc:AlternateContent>
-  <p:timing>
-    <p:tnLst>
-      <p:par>
-        <p:cTn id="1" dur="indefinite" restart="never" nodeType="tmRoot"/>
-      </p:par>
-    </p:tnLst>
-  </p:timing>
 </p:sld>
 </file>
 
@@ -17636,8 +17358,8 @@
           </a:p>
         </p:txBody>
       </p:sp>
-      <mc:AlternateContent xmlns:mc="http://schemas.openxmlformats.org/markup-compatibility/2006">
-        <mc:Choice xmlns:a14="http://schemas.microsoft.com/office/drawing/2010/main" Requires="a14">
+      <mc:AlternateContent xmlns:mc="http://schemas.openxmlformats.org/markup-compatibility/2006" xmlns:a14="http://schemas.microsoft.com/office/drawing/2010/main">
+        <mc:Choice Requires="a14">
           <p:sp>
             <p:nvSpPr>
               <p:cNvPr id="4" name="ZoneTexte 3"/>
@@ -17660,6 +17382,7 @@
               </a:bodyPr>
               <a:lstStyle/>
               <a:p>
+                <a:pPr/>
                 <a14:m>
                   <m:oMathPara xmlns:m="http://purl.oclc.org/ooxml/officeDocument/math">
                     <m:oMathParaPr>
@@ -17700,7 +17423,7 @@
             </p:txBody>
           </p:sp>
         </mc:Choice>
-        <mc:Fallback>
+        <mc:Fallback xmlns:p="http://schemas.openxmlformats.org/presentationml/2006/main" xmlns:r="http://schemas.openxmlformats.org/officeDocument/2006/relationships" xmlns:a="http://schemas.openxmlformats.org/drawingml/2006/main" xmlns="">
           <p:sp>
             <p:nvSpPr>
               <p:cNvPr id="4" name="ZoneTexte 3"/>
@@ -17755,19 +17478,12 @@
         <p15:prstTrans prst="airplane"/>
       </p:transition>
     </mc:Choice>
-    <mc:Fallback xmlns:p="http://schemas.openxmlformats.org/presentationml/2006/main" xmlns:r="http://schemas.openxmlformats.org/officeDocument/2006/relationships" xmlns:a="http://schemas.openxmlformats.org/drawingml/2006/main" xmlns="">
+    <mc:Fallback xmlns="" xmlns:a="http://schemas.openxmlformats.org/drawingml/2006/main" xmlns:r="http://schemas.openxmlformats.org/officeDocument/2006/relationships" xmlns:p="http://schemas.openxmlformats.org/presentationml/2006/main">
       <p:transition spd="slow">
         <p:fade/>
       </p:transition>
     </mc:Fallback>
   </mc:AlternateContent>
-  <p:timing>
-    <p:tnLst>
-      <p:par>
-        <p:cTn id="1" dur="indefinite" restart="never" nodeType="tmRoot"/>
-      </p:par>
-    </p:tnLst>
-  </p:timing>
 </p:sld>
 </file>
 
@@ -17858,8 +17574,8 @@
           </a:p>
         </p:txBody>
       </p:sp>
-      <mc:AlternateContent xmlns:mc="http://schemas.openxmlformats.org/markup-compatibility/2006">
-        <mc:Choice xmlns:a14="http://schemas.microsoft.com/office/drawing/2010/main" Requires="a14">
+      <mc:AlternateContent xmlns:mc="http://schemas.openxmlformats.org/markup-compatibility/2006" xmlns:a14="http://schemas.microsoft.com/office/drawing/2010/main">
+        <mc:Choice Requires="a14">
           <p:sp>
             <p:nvSpPr>
               <p:cNvPr id="6" name="ZoneTexte 5"/>
@@ -17882,6 +17598,7 @@
               </a:bodyPr>
               <a:lstStyle/>
               <a:p>
+                <a:pPr/>
                 <a14:m>
                   <m:oMathPara xmlns:m="http://purl.oclc.org/ooxml/officeDocument/math">
                     <m:oMathParaPr>
@@ -17922,7 +17639,7 @@
             </p:txBody>
           </p:sp>
         </mc:Choice>
-        <mc:Fallback>
+        <mc:Fallback xmlns:p="http://schemas.openxmlformats.org/presentationml/2006/main" xmlns:r="http://schemas.openxmlformats.org/officeDocument/2006/relationships" xmlns:a="http://schemas.openxmlformats.org/drawingml/2006/main" xmlns="">
           <p:sp>
             <p:nvSpPr>
               <p:cNvPr id="6" name="ZoneTexte 5"/>
@@ -18206,8 +17923,8 @@
           </a:p>
         </p:txBody>
       </p:sp>
-      <mc:AlternateContent xmlns:mc="http://schemas.openxmlformats.org/markup-compatibility/2006">
-        <mc:Choice xmlns:a14="http://schemas.microsoft.com/office/drawing/2010/main" Requires="a14">
+      <mc:AlternateContent xmlns:mc="http://schemas.openxmlformats.org/markup-compatibility/2006" xmlns:a14="http://schemas.microsoft.com/office/drawing/2010/main">
+        <mc:Choice Requires="a14">
           <p:sp>
             <p:nvSpPr>
               <p:cNvPr id="4" name="ZoneTexte 3"/>
@@ -18230,6 +17947,7 @@
               </a:bodyPr>
               <a:lstStyle/>
               <a:p>
+                <a:pPr/>
                 <a14:m>
                   <m:oMathPara xmlns:m="http://purl.oclc.org/ooxml/officeDocument/math">
                     <m:oMathParaPr>
@@ -18270,7 +17988,7 @@
             </p:txBody>
           </p:sp>
         </mc:Choice>
-        <mc:Fallback>
+        <mc:Fallback xmlns:p="http://schemas.openxmlformats.org/presentationml/2006/main" xmlns:r="http://schemas.openxmlformats.org/officeDocument/2006/relationships" xmlns:a="http://schemas.openxmlformats.org/drawingml/2006/main" xmlns="">
           <p:sp>
             <p:nvSpPr>
               <p:cNvPr id="4" name="ZoneTexte 3"/>
@@ -18563,8 +18281,8 @@
           </a:p>
         </p:txBody>
       </p:sp>
-      <mc:AlternateContent xmlns:mc="http://schemas.openxmlformats.org/markup-compatibility/2006">
-        <mc:Choice xmlns:a14="http://schemas.microsoft.com/office/drawing/2010/main" Requires="a14">
+      <mc:AlternateContent xmlns:mc="http://schemas.openxmlformats.org/markup-compatibility/2006" xmlns:a14="http://schemas.microsoft.com/office/drawing/2010/main">
+        <mc:Choice Requires="a14">
           <p:sp>
             <p:nvSpPr>
               <p:cNvPr id="4" name="ZoneTexte 3"/>
@@ -18587,6 +18305,7 @@
               </a:bodyPr>
               <a:lstStyle/>
               <a:p>
+                <a:pPr/>
                 <a14:m>
                   <m:oMathPara xmlns:m="http://purl.oclc.org/ooxml/officeDocument/math">
                     <m:oMathParaPr>
@@ -18627,7 +18346,7 @@
             </p:txBody>
           </p:sp>
         </mc:Choice>
-        <mc:Fallback>
+        <mc:Fallback xmlns:p="http://schemas.openxmlformats.org/presentationml/2006/main" xmlns:r="http://schemas.openxmlformats.org/officeDocument/2006/relationships" xmlns:a="http://schemas.openxmlformats.org/drawingml/2006/main" xmlns="">
           <p:sp>
             <p:nvSpPr>
               <p:cNvPr id="4" name="ZoneTexte 3"/>
@@ -18924,13 +18643,13 @@
                 <a:latin typeface="Arial" panose="020B0604020202020204" pitchFamily="34" charset="0"/>
                 <a:cs typeface="Arial" panose="020B0604020202020204" pitchFamily="34" charset="0"/>
               </a:rPr>
-              <a:t>Logiciel et environnement utiliser</a:t>
+              <a:t>Logiciel et environnement utilisé</a:t>
             </a:r>
           </a:p>
         </p:txBody>
       </p:sp>
-      <mc:AlternateContent xmlns:mc="http://schemas.openxmlformats.org/markup-compatibility/2006">
-        <mc:Choice xmlns:a14="http://schemas.microsoft.com/office/drawing/2010/main" Requires="a14">
+      <mc:AlternateContent xmlns:mc="http://schemas.openxmlformats.org/markup-compatibility/2006" xmlns:a14="http://schemas.microsoft.com/office/drawing/2010/main">
+        <mc:Choice Requires="a14">
           <p:sp>
             <p:nvSpPr>
               <p:cNvPr id="4" name="ZoneTexte 3"/>
@@ -18953,6 +18672,7 @@
               </a:bodyPr>
               <a:lstStyle/>
               <a:p>
+                <a:pPr/>
                 <a14:m>
                   <m:oMathPara xmlns:m="http://purl.oclc.org/ooxml/officeDocument/math">
                     <m:oMathParaPr>
@@ -18993,7 +18713,7 @@
             </p:txBody>
           </p:sp>
         </mc:Choice>
-        <mc:Fallback>
+        <mc:Fallback xmlns:p="http://schemas.openxmlformats.org/presentationml/2006/main" xmlns:r="http://schemas.openxmlformats.org/officeDocument/2006/relationships" xmlns:a="http://schemas.openxmlformats.org/drawingml/2006/main" xmlns="">
           <p:sp>
             <p:nvSpPr>
               <p:cNvPr id="4" name="ZoneTexte 3"/>
@@ -19290,7 +19010,7 @@
                 <a:latin typeface="Arial" panose="020B0604020202020204" pitchFamily="34" charset="0"/>
                 <a:cs typeface="Arial" panose="020B0604020202020204" pitchFamily="34" charset="0"/>
               </a:rPr>
-              <a:t>Logiciel et environnement utiliser</a:t>
+              <a:t>Logiciel et environnement utilisé</a:t>
             </a:r>
           </a:p>
           <a:p>
@@ -19304,8 +19024,8 @@
           </a:p>
         </p:txBody>
       </p:sp>
-      <mc:AlternateContent xmlns:mc="http://schemas.openxmlformats.org/markup-compatibility/2006">
-        <mc:Choice xmlns:a14="http://schemas.microsoft.com/office/drawing/2010/main" Requires="a14">
+      <mc:AlternateContent xmlns:mc="http://schemas.openxmlformats.org/markup-compatibility/2006" xmlns:a14="http://schemas.microsoft.com/office/drawing/2010/main">
+        <mc:Choice Requires="a14">
           <p:sp>
             <p:nvSpPr>
               <p:cNvPr id="4" name="ZoneTexte 3"/>
@@ -19328,6 +19048,7 @@
               </a:bodyPr>
               <a:lstStyle/>
               <a:p>
+                <a:pPr/>
                 <a14:m>
                   <m:oMathPara xmlns:m="http://purl.oclc.org/ooxml/officeDocument/math">
                     <m:oMathParaPr>
@@ -19368,7 +19089,7 @@
             </p:txBody>
           </p:sp>
         </mc:Choice>
-        <mc:Fallback>
+        <mc:Fallback xmlns:p="http://schemas.openxmlformats.org/presentationml/2006/main" xmlns:r="http://schemas.openxmlformats.org/officeDocument/2006/relationships" xmlns:a="http://schemas.openxmlformats.org/drawingml/2006/main" xmlns="">
           <p:sp>
             <p:nvSpPr>
               <p:cNvPr id="4" name="ZoneTexte 3"/>
@@ -19665,7 +19386,7 @@
                 <a:latin typeface="Arial" panose="020B0604020202020204" pitchFamily="34" charset="0"/>
                 <a:cs typeface="Arial" panose="020B0604020202020204" pitchFamily="34" charset="0"/>
               </a:rPr>
-              <a:t>Logiciel et environnement utiliser</a:t>
+              <a:t>Logiciel et environnement utilisé</a:t>
             </a:r>
           </a:p>
           <a:p>
@@ -19688,8 +19409,8 @@
           </a:p>
         </p:txBody>
       </p:sp>
-      <mc:AlternateContent xmlns:mc="http://schemas.openxmlformats.org/markup-compatibility/2006">
-        <mc:Choice xmlns:a14="http://schemas.microsoft.com/office/drawing/2010/main" Requires="a14">
+      <mc:AlternateContent xmlns:mc="http://schemas.openxmlformats.org/markup-compatibility/2006" xmlns:a14="http://schemas.microsoft.com/office/drawing/2010/main">
+        <mc:Choice Requires="a14">
           <p:sp>
             <p:nvSpPr>
               <p:cNvPr id="4" name="ZoneTexte 3"/>
@@ -19712,6 +19433,7 @@
               </a:bodyPr>
               <a:lstStyle/>
               <a:p>
+                <a:pPr/>
                 <a14:m>
                   <m:oMathPara xmlns:m="http://purl.oclc.org/ooxml/officeDocument/math">
                     <m:oMathParaPr>
@@ -19752,7 +19474,7 @@
             </p:txBody>
           </p:sp>
         </mc:Choice>
-        <mc:Fallback>
+        <mc:Fallback xmlns:p="http://schemas.openxmlformats.org/presentationml/2006/main" xmlns:r="http://schemas.openxmlformats.org/officeDocument/2006/relationships" xmlns:a="http://schemas.openxmlformats.org/drawingml/2006/main" xmlns="">
           <p:sp>
             <p:nvSpPr>
               <p:cNvPr id="4" name="ZoneTexte 3"/>
@@ -20062,8 +19784,8 @@
           </a:p>
         </p:txBody>
       </p:sp>
-      <mc:AlternateContent xmlns:mc="http://schemas.openxmlformats.org/markup-compatibility/2006">
-        <mc:Choice xmlns:a14="http://schemas.microsoft.com/office/drawing/2010/main" Requires="a14">
+      <mc:AlternateContent xmlns:mc="http://schemas.openxmlformats.org/markup-compatibility/2006" xmlns:a14="http://schemas.microsoft.com/office/drawing/2010/main">
+        <mc:Choice Requires="a14">
           <p:sp>
             <p:nvSpPr>
               <p:cNvPr id="7" name="ZoneTexte 6"/>
@@ -20086,6 +19808,7 @@
               </a:bodyPr>
               <a:lstStyle/>
               <a:p>
+                <a:pPr/>
                 <a14:m>
                   <m:oMathPara xmlns:m="http://purl.oclc.org/ooxml/officeDocument/math">
                     <m:oMathParaPr>
@@ -20126,7 +19849,7 @@
             </p:txBody>
           </p:sp>
         </mc:Choice>
-        <mc:Fallback>
+        <mc:Fallback xmlns:p="http://schemas.openxmlformats.org/presentationml/2006/main" xmlns:r="http://schemas.openxmlformats.org/officeDocument/2006/relationships" xmlns:a="http://schemas.openxmlformats.org/drawingml/2006/main" xmlns="">
           <p:sp>
             <p:nvSpPr>
               <p:cNvPr id="7" name="ZoneTexte 6"/>
@@ -20181,19 +19904,12 @@
         <p15:prstTrans prst="fracture"/>
       </p:transition>
     </mc:Choice>
-    <mc:Fallback xmlns="" xmlns:a="http://schemas.openxmlformats.org/drawingml/2006/main" xmlns:r="http://schemas.openxmlformats.org/officeDocument/2006/relationships" xmlns:p="http://schemas.openxmlformats.org/presentationml/2006/main">
+    <mc:Fallback xmlns:p="http://schemas.openxmlformats.org/presentationml/2006/main" xmlns:r="http://schemas.openxmlformats.org/officeDocument/2006/relationships" xmlns:a="http://schemas.openxmlformats.org/drawingml/2006/main" xmlns="">
       <p:transition spd="slow">
         <p:fade/>
       </p:transition>
     </mc:Fallback>
   </mc:AlternateContent>
-  <p:timing>
-    <p:tnLst>
-      <p:par>
-        <p:cTn id="1" dur="indefinite" restart="never" nodeType="tmRoot"/>
-      </p:par>
-    </p:tnLst>
-  </p:timing>
 </p:sld>
 </file>
 

</xml_diff>